<commit_message>
PDF final version sent to print services
</commit_message>
<xml_diff>
--- a/200212_poster_reward.pptx
+++ b/200212_poster_reward.pptx
@@ -16,7 +16,7 @@
     <p:sldId id="258" r:id="rId4"/>
   </p:sldIdLst>
   <p:sldSz cx="30275213" cy="42803763"/>
-  <p:notesSz cx="6858000" cy="9144000"/>
+  <p:notesSz cx="7315200" cy="9601200"/>
   <p:defaultTextStyle>
     <a:defPPr>
       <a:defRPr lang="en-US"/>
@@ -118,12 +118,12 @@
     </p:ext>
     <p:ext uri="{2D200454-40CA-4A62-9FC3-DE9A4176ACB9}">
       <p15:notesGuideLst xmlns:p15="http://schemas.microsoft.com/office/powerpoint/2012/main">
-        <p15:guide id="1" orient="horz" pos="2880">
+        <p15:guide id="1" orient="horz" pos="3024" userDrawn="1">
           <p15:clr>
             <a:srgbClr val="A4A3A4"/>
           </p15:clr>
         </p15:guide>
-        <p15:guide id="2" pos="2160">
+        <p15:guide id="2" pos="2304" userDrawn="1">
           <p15:clr>
             <a:srgbClr val="A4A3A4"/>
           </p15:clr>
@@ -671,21 +671,21 @@
         <p:spPr>
           <a:xfrm>
             <a:off x="0" y="0"/>
-            <a:ext cx="2971800" cy="457200"/>
+            <a:ext cx="3169920" cy="480060"/>
           </a:xfrm>
           <a:prstGeom prst="rect">
             <a:avLst/>
           </a:prstGeom>
         </p:spPr>
         <p:txBody>
-          <a:bodyPr vert="horz" lIns="91440" tIns="45720" rIns="91440" bIns="45720" rtlCol="0"/>
+          <a:bodyPr vert="horz" lIns="96661" tIns="48331" rIns="96661" bIns="48331" rtlCol="0"/>
           <a:lstStyle>
             <a:lvl1pPr algn="l">
-              <a:defRPr sz="1200"/>
+              <a:defRPr sz="1300"/>
             </a:lvl1pPr>
           </a:lstStyle>
           <a:p>
-            <a:endParaRPr lang="en-US"/>
+            <a:endParaRPr lang="en-US" dirty="0"/>
           </a:p>
         </p:txBody>
       </p:sp>
@@ -701,27 +701,27 @@
         </p:nvSpPr>
         <p:spPr>
           <a:xfrm>
-            <a:off x="3884613" y="0"/>
-            <a:ext cx="2971800" cy="457200"/>
+            <a:off x="4143587" y="0"/>
+            <a:ext cx="3169920" cy="480060"/>
           </a:xfrm>
           <a:prstGeom prst="rect">
             <a:avLst/>
           </a:prstGeom>
         </p:spPr>
         <p:txBody>
-          <a:bodyPr vert="horz" lIns="91440" tIns="45720" rIns="91440" bIns="45720" rtlCol="0"/>
+          <a:bodyPr vert="horz" lIns="96661" tIns="48331" rIns="96661" bIns="48331" rtlCol="0"/>
           <a:lstStyle>
             <a:lvl1pPr algn="r">
-              <a:defRPr sz="1200"/>
+              <a:defRPr sz="1300"/>
             </a:lvl1pPr>
           </a:lstStyle>
           <a:p>
             <a:fld id="{0158C5BC-9A70-462C-B28D-9600239EAC64}" type="datetimeFigureOut">
               <a:rPr lang="en-US" smtClean="0"/>
               <a:pPr/>
-              <a:t>2/12/2020</a:t>
+              <a:t>2/13/2020</a:t>
             </a:fld>
-            <a:endParaRPr lang="en-US"/>
+            <a:endParaRPr lang="en-US" dirty="0"/>
           </a:p>
         </p:txBody>
       </p:sp>
@@ -737,22 +737,22 @@
         </p:nvSpPr>
         <p:spPr>
           <a:xfrm>
-            <a:off x="0" y="8685213"/>
-            <a:ext cx="2971800" cy="457200"/>
+            <a:off x="0" y="9119474"/>
+            <a:ext cx="3169920" cy="480060"/>
           </a:xfrm>
           <a:prstGeom prst="rect">
             <a:avLst/>
           </a:prstGeom>
         </p:spPr>
         <p:txBody>
-          <a:bodyPr vert="horz" lIns="91440" tIns="45720" rIns="91440" bIns="45720" rtlCol="0" anchor="b"/>
+          <a:bodyPr vert="horz" lIns="96661" tIns="48331" rIns="96661" bIns="48331" rtlCol="0" anchor="b"/>
           <a:lstStyle>
             <a:lvl1pPr algn="l">
-              <a:defRPr sz="1200"/>
+              <a:defRPr sz="1300"/>
             </a:lvl1pPr>
           </a:lstStyle>
           <a:p>
-            <a:endParaRPr lang="en-US"/>
+            <a:endParaRPr lang="en-US" dirty="0"/>
           </a:p>
         </p:txBody>
       </p:sp>
@@ -768,18 +768,18 @@
         </p:nvSpPr>
         <p:spPr>
           <a:xfrm>
-            <a:off x="3884613" y="8685213"/>
-            <a:ext cx="2971800" cy="457200"/>
+            <a:off x="4143587" y="9119474"/>
+            <a:ext cx="3169920" cy="480060"/>
           </a:xfrm>
           <a:prstGeom prst="rect">
             <a:avLst/>
           </a:prstGeom>
         </p:spPr>
         <p:txBody>
-          <a:bodyPr vert="horz" lIns="91440" tIns="45720" rIns="91440" bIns="45720" rtlCol="0" anchor="b"/>
+          <a:bodyPr vert="horz" lIns="96661" tIns="48331" rIns="96661" bIns="48331" rtlCol="0" anchor="b"/>
           <a:lstStyle>
             <a:lvl1pPr algn="r">
-              <a:defRPr sz="1200"/>
+              <a:defRPr sz="1300"/>
             </a:lvl1pPr>
           </a:lstStyle>
           <a:p>
@@ -788,7 +788,7 @@
               <a:pPr/>
               <a:t>‹#›</a:t>
             </a:fld>
-            <a:endParaRPr lang="en-US"/>
+            <a:endParaRPr lang="en-US" dirty="0"/>
           </a:p>
         </p:txBody>
       </p:sp>
@@ -838,17 +838,17 @@
         <p:spPr>
           <a:xfrm>
             <a:off x="0" y="0"/>
-            <a:ext cx="2971800" cy="457200"/>
+            <a:ext cx="3169920" cy="480060"/>
           </a:xfrm>
           <a:prstGeom prst="rect">
             <a:avLst/>
           </a:prstGeom>
         </p:spPr>
         <p:txBody>
-          <a:bodyPr vert="horz" lIns="91440" tIns="45720" rIns="91440" bIns="45720" rtlCol="0"/>
+          <a:bodyPr vert="horz" lIns="96661" tIns="48331" rIns="96661" bIns="48331" rtlCol="0"/>
           <a:lstStyle>
             <a:lvl1pPr algn="l">
-              <a:defRPr sz="1200"/>
+              <a:defRPr sz="1300"/>
             </a:lvl1pPr>
           </a:lstStyle>
           <a:p>
@@ -868,25 +868,25 @@
         </p:nvSpPr>
         <p:spPr>
           <a:xfrm>
-            <a:off x="3884613" y="0"/>
-            <a:ext cx="2971800" cy="457200"/>
+            <a:off x="4143587" y="0"/>
+            <a:ext cx="3169920" cy="480060"/>
           </a:xfrm>
           <a:prstGeom prst="rect">
             <a:avLst/>
           </a:prstGeom>
         </p:spPr>
         <p:txBody>
-          <a:bodyPr vert="horz" lIns="91440" tIns="45720" rIns="91440" bIns="45720" rtlCol="0"/>
+          <a:bodyPr vert="horz" lIns="96661" tIns="48331" rIns="96661" bIns="48331" rtlCol="0"/>
           <a:lstStyle>
             <a:lvl1pPr algn="r">
-              <a:defRPr sz="1200"/>
+              <a:defRPr sz="1300"/>
             </a:lvl1pPr>
           </a:lstStyle>
           <a:p>
             <a:fld id="{E6CC2317-6751-4CD4-9995-8782DD78E936}" type="datetimeFigureOut">
               <a:rPr lang="en-US" smtClean="0"/>
               <a:pPr/>
-              <a:t>2/12/2020</a:t>
+              <a:t>2/13/2020</a:t>
             </a:fld>
             <a:endParaRPr lang="en-US" dirty="0"/>
           </a:p>
@@ -904,8 +904,8 @@
         </p:nvSpPr>
         <p:spPr>
           <a:xfrm>
-            <a:off x="2216150" y="685800"/>
-            <a:ext cx="2425700" cy="3429000"/>
+            <a:off x="2384425" y="720725"/>
+            <a:ext cx="2546350" cy="3600450"/>
           </a:xfrm>
           <a:prstGeom prst="rect">
             <a:avLst/>
@@ -918,7 +918,7 @@
           </a:ln>
         </p:spPr>
         <p:txBody>
-          <a:bodyPr vert="horz" lIns="91440" tIns="45720" rIns="91440" bIns="45720" rtlCol="0" anchor="ctr"/>
+          <a:bodyPr vert="horz" lIns="96661" tIns="48331" rIns="96661" bIns="48331" rtlCol="0" anchor="ctr"/>
           <a:lstStyle/>
           <a:p>
             <a:endParaRPr lang="en-US" dirty="0"/>
@@ -937,15 +937,15 @@
         </p:nvSpPr>
         <p:spPr>
           <a:xfrm>
-            <a:off x="685800" y="4343400"/>
-            <a:ext cx="5486400" cy="4114800"/>
+            <a:off x="731520" y="4560570"/>
+            <a:ext cx="5852160" cy="4320540"/>
           </a:xfrm>
           <a:prstGeom prst="rect">
             <a:avLst/>
           </a:prstGeom>
         </p:spPr>
         <p:txBody>
-          <a:bodyPr vert="horz" lIns="91440" tIns="45720" rIns="91440" bIns="45720" rtlCol="0">
+          <a:bodyPr vert="horz" lIns="96661" tIns="48331" rIns="96661" bIns="48331" rtlCol="0">
             <a:normAutofit/>
           </a:bodyPr>
           <a:lstStyle/>
@@ -998,18 +998,18 @@
         </p:nvSpPr>
         <p:spPr>
           <a:xfrm>
-            <a:off x="0" y="8685213"/>
-            <a:ext cx="2971800" cy="457200"/>
+            <a:off x="0" y="9119474"/>
+            <a:ext cx="3169920" cy="480060"/>
           </a:xfrm>
           <a:prstGeom prst="rect">
             <a:avLst/>
           </a:prstGeom>
         </p:spPr>
         <p:txBody>
-          <a:bodyPr vert="horz" lIns="91440" tIns="45720" rIns="91440" bIns="45720" rtlCol="0" anchor="b"/>
+          <a:bodyPr vert="horz" lIns="96661" tIns="48331" rIns="96661" bIns="48331" rtlCol="0" anchor="b"/>
           <a:lstStyle>
             <a:lvl1pPr algn="l">
-              <a:defRPr sz="1200"/>
+              <a:defRPr sz="1300"/>
             </a:lvl1pPr>
           </a:lstStyle>
           <a:p>
@@ -1029,18 +1029,18 @@
         </p:nvSpPr>
         <p:spPr>
           <a:xfrm>
-            <a:off x="3884613" y="8685213"/>
-            <a:ext cx="2971800" cy="457200"/>
+            <a:off x="4143587" y="9119474"/>
+            <a:ext cx="3169920" cy="480060"/>
           </a:xfrm>
           <a:prstGeom prst="rect">
             <a:avLst/>
           </a:prstGeom>
         </p:spPr>
         <p:txBody>
-          <a:bodyPr vert="horz" lIns="91440" tIns="45720" rIns="91440" bIns="45720" rtlCol="0" anchor="b"/>
+          <a:bodyPr vert="horz" lIns="96661" tIns="48331" rIns="96661" bIns="48331" rtlCol="0" anchor="b"/>
           <a:lstStyle>
             <a:lvl1pPr algn="r">
-              <a:defRPr sz="1200"/>
+              <a:defRPr sz="1300"/>
             </a:lvl1pPr>
           </a:lstStyle>
           <a:p>
@@ -2568,9 +2568,9 @@
           <a:p>
             <a:fld id="{55B39ADB-CF7C-4B5D-B761-0D66E66A68C4}" type="datetimeFigureOut">
               <a:rPr lang="en-GB" smtClean="0"/>
-              <a:t>12/02/2020</a:t>
+              <a:t>13/02/2020</a:t>
             </a:fld>
-            <a:endParaRPr lang="en-GB"/>
+            <a:endParaRPr lang="en-GB" dirty="0"/>
           </a:p>
         </p:txBody>
       </p:sp>
@@ -2589,7 +2589,7 @@
           <a:bodyPr/>
           <a:lstStyle/>
           <a:p>
-            <a:endParaRPr lang="en-GB"/>
+            <a:endParaRPr lang="en-GB" dirty="0"/>
           </a:p>
         </p:txBody>
       </p:sp>
@@ -2612,7 +2612,7 @@
               <a:rPr lang="en-GB" smtClean="0"/>
               <a:t>‹#›</a:t>
             </a:fld>
-            <a:endParaRPr lang="en-GB"/>
+            <a:endParaRPr lang="en-GB" dirty="0"/>
           </a:p>
         </p:txBody>
       </p:sp>
@@ -2858,9 +2858,9 @@
           <a:p>
             <a:fld id="{55B39ADB-CF7C-4B5D-B761-0D66E66A68C4}" type="datetimeFigureOut">
               <a:rPr lang="en-GB" smtClean="0"/>
-              <a:t>12/02/2020</a:t>
+              <a:t>13/02/2020</a:t>
             </a:fld>
-            <a:endParaRPr lang="en-GB"/>
+            <a:endParaRPr lang="en-GB" dirty="0"/>
           </a:p>
         </p:txBody>
       </p:sp>
@@ -2879,7 +2879,7 @@
           <a:bodyPr/>
           <a:lstStyle/>
           <a:p>
-            <a:endParaRPr lang="en-GB"/>
+            <a:endParaRPr lang="en-GB" dirty="0"/>
           </a:p>
         </p:txBody>
       </p:sp>
@@ -2902,7 +2902,7 @@
               <a:rPr lang="en-GB" smtClean="0"/>
               <a:t>‹#›</a:t>
             </a:fld>
-            <a:endParaRPr lang="en-GB"/>
+            <a:endParaRPr lang="en-GB" dirty="0"/>
           </a:p>
         </p:txBody>
       </p:sp>
@@ -3033,10 +3033,9 @@
           </a:lstStyle>
           <a:p>
             <a:r>
-              <a:rPr lang="en-US"/>
+              <a:rPr lang="en-US" dirty="0"/>
               <a:t>Click icon to add picture</a:t>
             </a:r>
-            <a:endParaRPr lang="en-US" dirty="0"/>
           </a:p>
         </p:txBody>
       </p:sp>
@@ -3130,9 +3129,9 @@
           <a:p>
             <a:fld id="{55B39ADB-CF7C-4B5D-B761-0D66E66A68C4}" type="datetimeFigureOut">
               <a:rPr lang="en-GB" smtClean="0"/>
-              <a:t>12/02/2020</a:t>
+              <a:t>13/02/2020</a:t>
             </a:fld>
-            <a:endParaRPr lang="en-GB"/>
+            <a:endParaRPr lang="en-GB" dirty="0"/>
           </a:p>
         </p:txBody>
       </p:sp>
@@ -3151,7 +3150,7 @@
           <a:bodyPr/>
           <a:lstStyle/>
           <a:p>
-            <a:endParaRPr lang="en-GB"/>
+            <a:endParaRPr lang="en-GB" dirty="0"/>
           </a:p>
         </p:txBody>
       </p:sp>
@@ -3174,7 +3173,7 @@
               <a:rPr lang="en-GB" smtClean="0"/>
               <a:t>‹#›</a:t>
             </a:fld>
-            <a:endParaRPr lang="en-GB"/>
+            <a:endParaRPr lang="en-GB" dirty="0"/>
           </a:p>
         </p:txBody>
       </p:sp>
@@ -3300,9 +3299,9 @@
           <a:p>
             <a:fld id="{55B39ADB-CF7C-4B5D-B761-0D66E66A68C4}" type="datetimeFigureOut">
               <a:rPr lang="en-GB" smtClean="0"/>
-              <a:t>12/02/2020</a:t>
+              <a:t>13/02/2020</a:t>
             </a:fld>
-            <a:endParaRPr lang="en-GB"/>
+            <a:endParaRPr lang="en-GB" dirty="0"/>
           </a:p>
         </p:txBody>
       </p:sp>
@@ -3321,7 +3320,7 @@
           <a:bodyPr/>
           <a:lstStyle/>
           <a:p>
-            <a:endParaRPr lang="en-GB"/>
+            <a:endParaRPr lang="en-GB" dirty="0"/>
           </a:p>
         </p:txBody>
       </p:sp>
@@ -3344,7 +3343,7 @@
               <a:rPr lang="en-GB" smtClean="0"/>
               <a:t>‹#›</a:t>
             </a:fld>
-            <a:endParaRPr lang="en-GB"/>
+            <a:endParaRPr lang="en-GB" dirty="0"/>
           </a:p>
         </p:txBody>
       </p:sp>
@@ -3480,9 +3479,9 @@
           <a:p>
             <a:fld id="{55B39ADB-CF7C-4B5D-B761-0D66E66A68C4}" type="datetimeFigureOut">
               <a:rPr lang="en-GB" smtClean="0"/>
-              <a:t>12/02/2020</a:t>
+              <a:t>13/02/2020</a:t>
             </a:fld>
-            <a:endParaRPr lang="en-GB"/>
+            <a:endParaRPr lang="en-GB" dirty="0"/>
           </a:p>
         </p:txBody>
       </p:sp>
@@ -3501,7 +3500,7 @@
           <a:bodyPr/>
           <a:lstStyle/>
           <a:p>
-            <a:endParaRPr lang="en-GB"/>
+            <a:endParaRPr lang="en-GB" dirty="0"/>
           </a:p>
         </p:txBody>
       </p:sp>
@@ -3524,7 +3523,7 @@
               <a:rPr lang="en-GB" smtClean="0"/>
               <a:t>‹#›</a:t>
             </a:fld>
-            <a:endParaRPr lang="en-GB"/>
+            <a:endParaRPr lang="en-GB" dirty="0"/>
           </a:p>
         </p:txBody>
       </p:sp>
@@ -6524,9 +6523,9 @@
           <a:p>
             <a:fld id="{55B39ADB-CF7C-4B5D-B761-0D66E66A68C4}" type="datetimeFigureOut">
               <a:rPr lang="en-GB" smtClean="0"/>
-              <a:t>12/02/2020</a:t>
+              <a:t>13/02/2020</a:t>
             </a:fld>
-            <a:endParaRPr lang="en-GB"/>
+            <a:endParaRPr lang="en-GB" dirty="0"/>
           </a:p>
         </p:txBody>
       </p:sp>
@@ -6553,7 +6552,7 @@
             </a:lvl1pPr>
           </a:lstStyle>
           <a:p>
-            <a:endParaRPr lang="en-GB"/>
+            <a:endParaRPr lang="en-GB" dirty="0"/>
           </a:p>
         </p:txBody>
       </p:sp>
@@ -6584,7 +6583,7 @@
               <a:rPr lang="en-GB" smtClean="0"/>
               <a:t>‹#›</a:t>
             </a:fld>
-            <a:endParaRPr lang="en-GB"/>
+            <a:endParaRPr lang="en-GB" dirty="0"/>
           </a:p>
         </p:txBody>
       </p:sp>
@@ -6752,9 +6751,9 @@
           <a:p>
             <a:fld id="{55B39ADB-CF7C-4B5D-B761-0D66E66A68C4}" type="datetimeFigureOut">
               <a:rPr lang="en-GB" smtClean="0"/>
-              <a:t>12/02/2020</a:t>
+              <a:t>13/02/2020</a:t>
             </a:fld>
-            <a:endParaRPr lang="en-GB"/>
+            <a:endParaRPr lang="en-GB" dirty="0"/>
           </a:p>
         </p:txBody>
       </p:sp>
@@ -6773,7 +6772,7 @@
           <a:bodyPr/>
           <a:lstStyle/>
           <a:p>
-            <a:endParaRPr lang="en-GB"/>
+            <a:endParaRPr lang="en-GB" dirty="0"/>
           </a:p>
         </p:txBody>
       </p:sp>
@@ -6796,7 +6795,7 @@
               <a:rPr lang="en-GB" smtClean="0"/>
               <a:t>‹#›</a:t>
             </a:fld>
-            <a:endParaRPr lang="en-GB"/>
+            <a:endParaRPr lang="en-GB" dirty="0"/>
           </a:p>
         </p:txBody>
       </p:sp>
@@ -7003,9 +7002,9 @@
           <a:p>
             <a:fld id="{55B39ADB-CF7C-4B5D-B761-0D66E66A68C4}" type="datetimeFigureOut">
               <a:rPr lang="en-GB" smtClean="0"/>
-              <a:t>12/02/2020</a:t>
+              <a:t>13/02/2020</a:t>
             </a:fld>
-            <a:endParaRPr lang="en-GB"/>
+            <a:endParaRPr lang="en-GB" dirty="0"/>
           </a:p>
         </p:txBody>
       </p:sp>
@@ -7024,7 +7023,7 @@
           <a:bodyPr/>
           <a:lstStyle/>
           <a:p>
-            <a:endParaRPr lang="en-GB"/>
+            <a:endParaRPr lang="en-GB" dirty="0"/>
           </a:p>
         </p:txBody>
       </p:sp>
@@ -7047,7 +7046,7 @@
               <a:rPr lang="en-GB" smtClean="0"/>
               <a:t>‹#›</a:t>
             </a:fld>
-            <a:endParaRPr lang="en-GB"/>
+            <a:endParaRPr lang="en-GB" dirty="0"/>
           </a:p>
         </p:txBody>
       </p:sp>
@@ -7326,9 +7325,9 @@
           <a:p>
             <a:fld id="{55B39ADB-CF7C-4B5D-B761-0D66E66A68C4}" type="datetimeFigureOut">
               <a:rPr lang="en-GB" smtClean="0"/>
-              <a:t>12/02/2020</a:t>
+              <a:t>13/02/2020</a:t>
             </a:fld>
-            <a:endParaRPr lang="en-GB"/>
+            <a:endParaRPr lang="en-GB" dirty="0"/>
           </a:p>
         </p:txBody>
       </p:sp>
@@ -7347,7 +7346,7 @@
           <a:bodyPr/>
           <a:lstStyle/>
           <a:p>
-            <a:endParaRPr lang="en-GB"/>
+            <a:endParaRPr lang="en-GB" dirty="0"/>
           </a:p>
         </p:txBody>
       </p:sp>
@@ -7370,7 +7369,7 @@
               <a:rPr lang="en-GB" smtClean="0"/>
               <a:t>‹#›</a:t>
             </a:fld>
-            <a:endParaRPr lang="en-GB"/>
+            <a:endParaRPr lang="en-GB" dirty="0"/>
           </a:p>
         </p:txBody>
       </p:sp>
@@ -7750,9 +7749,9 @@
           <a:p>
             <a:fld id="{55B39ADB-CF7C-4B5D-B761-0D66E66A68C4}" type="datetimeFigureOut">
               <a:rPr lang="en-GB" smtClean="0"/>
-              <a:t>12/02/2020</a:t>
+              <a:t>13/02/2020</a:t>
             </a:fld>
-            <a:endParaRPr lang="en-GB"/>
+            <a:endParaRPr lang="en-GB" dirty="0"/>
           </a:p>
         </p:txBody>
       </p:sp>
@@ -7771,7 +7770,7 @@
           <a:bodyPr/>
           <a:lstStyle/>
           <a:p>
-            <a:endParaRPr lang="en-GB"/>
+            <a:endParaRPr lang="en-GB" dirty="0"/>
           </a:p>
         </p:txBody>
       </p:sp>
@@ -7794,7 +7793,7 @@
               <a:rPr lang="en-GB" smtClean="0"/>
               <a:t>‹#›</a:t>
             </a:fld>
-            <a:endParaRPr lang="en-GB"/>
+            <a:endParaRPr lang="en-GB" dirty="0"/>
           </a:p>
         </p:txBody>
       </p:sp>
@@ -7868,9 +7867,9 @@
           <a:p>
             <a:fld id="{55B39ADB-CF7C-4B5D-B761-0D66E66A68C4}" type="datetimeFigureOut">
               <a:rPr lang="en-GB" smtClean="0"/>
-              <a:t>12/02/2020</a:t>
+              <a:t>13/02/2020</a:t>
             </a:fld>
-            <a:endParaRPr lang="en-GB"/>
+            <a:endParaRPr lang="en-GB" dirty="0"/>
           </a:p>
         </p:txBody>
       </p:sp>
@@ -7889,7 +7888,7 @@
           <a:bodyPr/>
           <a:lstStyle/>
           <a:p>
-            <a:endParaRPr lang="en-GB"/>
+            <a:endParaRPr lang="en-GB" dirty="0"/>
           </a:p>
         </p:txBody>
       </p:sp>
@@ -7912,7 +7911,7 @@
               <a:rPr lang="en-GB" smtClean="0"/>
               <a:t>‹#›</a:t>
             </a:fld>
-            <a:endParaRPr lang="en-GB"/>
+            <a:endParaRPr lang="en-GB" dirty="0"/>
           </a:p>
         </p:txBody>
       </p:sp>
@@ -8209,7 +8208,7 @@
           <a:lstStyle/>
           <a:p>
             <a:pPr algn="ctr"/>
-            <a:endParaRPr lang="en-US" sz="6026"/>
+            <a:endParaRPr lang="en-US" sz="6026" dirty="0"/>
           </a:p>
         </p:txBody>
       </p:sp>
@@ -8282,7 +8281,7 @@
           <a:lstStyle/>
           <a:p>
             <a:pPr algn="ctr"/>
-            <a:endParaRPr lang="en-US" sz="6026"/>
+            <a:endParaRPr lang="en-US" sz="6026" dirty="0"/>
           </a:p>
         </p:txBody>
       </p:sp>
@@ -8472,7 +8471,7 @@
                         <a:t>We provide a series of online tutorials that will guide you through the poster design process and answer your poster production questions. For complete template tutorials, go online to </a:t>
                       </a:r>
                       <a:r>
-                        <a:rPr lang="en-US" sz="2600" i="0" dirty="0" err="1">
+                        <a:rPr lang="en-US" sz="2600" i="0" dirty="0">
                           <a:solidFill>
                             <a:srgbClr val="FFC000"/>
                           </a:solidFill>
@@ -8545,7 +8544,7 @@
                         <a:t>To print your poster using our same-day professional printing service, go online to </a:t>
                       </a:r>
                       <a:r>
-                        <a:rPr lang="en-US" sz="2600" i="0" dirty="0" err="1">
+                        <a:rPr lang="en-US" sz="2600" i="0" dirty="0">
                           <a:solidFill>
                             <a:srgbClr val="FFC000"/>
                           </a:solidFill>
@@ -10029,37 +10028,7 @@
                           <a:latin typeface="Arial" panose="020B0604020202020204" pitchFamily="34" charset="0"/>
                           <a:cs typeface="Arial" panose="020B0604020202020204" pitchFamily="34" charset="0"/>
                         </a:rPr>
-                        <a:t>https://</a:t>
-                      </a:r>
-                      <a:r>
-                        <a:rPr lang="en-US" sz="2600" u="sng" dirty="0" err="1">
-                          <a:solidFill>
-                            <a:srgbClr val="FFC000"/>
-                          </a:solidFill>
-                          <a:latin typeface="Arial" panose="020B0604020202020204" pitchFamily="34" charset="0"/>
-                          <a:cs typeface="Arial" panose="020B0604020202020204" pitchFamily="34" charset="0"/>
-                        </a:rPr>
-                        <a:t>www.posterpresentations.com</a:t>
-                      </a:r>
-                      <a:r>
-                        <a:rPr lang="en-US" sz="2600" u="sng" dirty="0">
-                          <a:solidFill>
-                            <a:srgbClr val="FFC000"/>
-                          </a:solidFill>
-                          <a:latin typeface="Arial" panose="020B0604020202020204" pitchFamily="34" charset="0"/>
-                          <a:cs typeface="Arial" panose="020B0604020202020204" pitchFamily="34" charset="0"/>
-                        </a:rPr>
-                        <a:t>/how-to-change-the-column-</a:t>
-                      </a:r>
-                      <a:r>
-                        <a:rPr lang="en-US" sz="2600" u="sng" dirty="0" err="1">
-                          <a:solidFill>
-                            <a:srgbClr val="FFC000"/>
-                          </a:solidFill>
-                          <a:latin typeface="Arial" panose="020B0604020202020204" pitchFamily="34" charset="0"/>
-                          <a:cs typeface="Arial" panose="020B0604020202020204" pitchFamily="34" charset="0"/>
-                        </a:rPr>
-                        <a:t>configuration.html</a:t>
+                        <a:t>https://www.posterpresentations.com/how-to-change-the-column-configuration.html</a:t>
                       </a:r>
                       <a:endParaRPr lang="en-US" sz="6000" u="sng" dirty="0">
                         <a:solidFill>
@@ -11107,7 +11076,7 @@
                         <a:t>When you are ready to have your poster printed go online to </a:t>
                       </a:r>
                       <a:r>
-                        <a:rPr lang="en-US" sz="2600" noProof="0" dirty="0" err="1">
+                        <a:rPr lang="en-US" sz="2600" noProof="0" dirty="0">
                           <a:solidFill>
                             <a:srgbClr val="FFC000"/>
                           </a:solidFill>
@@ -11214,7 +11183,7 @@
                         <a:t>Go to </a:t>
                       </a:r>
                       <a:r>
-                        <a:rPr lang="en-US" sz="2600" noProof="0" dirty="0" err="1">
+                        <a:rPr lang="en-US" sz="2600" noProof="0" dirty="0">
                           <a:solidFill>
                             <a:srgbClr val="FFC000"/>
                           </a:solidFill>
@@ -11358,7 +11327,7 @@
                         <a:t> </a:t>
                       </a:r>
                       <a:r>
-                        <a:rPr lang="en-US" sz="2600" dirty="0" err="1">
+                        <a:rPr lang="en-US" sz="2600" dirty="0">
                           <a:solidFill>
                             <a:schemeClr val="bg1">
                               <a:lumMod val="85000"/>
@@ -11536,37 +11505,7 @@
                           <a:latin typeface="Arial"/>
                           <a:cs typeface="Arial"/>
                         </a:rPr>
-                        <a:t>https://</a:t>
-                      </a:r>
-                      <a:r>
-                        <a:rPr lang="en-US" sz="2200" b="1" dirty="0" err="1">
-                          <a:solidFill>
-                            <a:srgbClr val="FFC000"/>
-                          </a:solidFill>
-                          <a:latin typeface="Arial"/>
-                          <a:cs typeface="Arial"/>
-                        </a:rPr>
-                        <a:t>www.posterpresentations.com</a:t>
-                      </a:r>
-                      <a:r>
-                        <a:rPr lang="en-US" sz="2200" b="1" dirty="0">
-                          <a:solidFill>
-                            <a:srgbClr val="FFC000"/>
-                          </a:solidFill>
-                          <a:latin typeface="Arial"/>
-                          <a:cs typeface="Arial"/>
-                        </a:rPr>
-                        <a:t>/</a:t>
-                      </a:r>
-                      <a:r>
-                        <a:rPr lang="en-US" sz="2200" b="1" dirty="0" err="1">
-                          <a:solidFill>
-                            <a:srgbClr val="FFC000"/>
-                          </a:solidFill>
-                          <a:latin typeface="Arial"/>
-                          <a:cs typeface="Arial"/>
-                        </a:rPr>
-                        <a:t>helpdesk.html</a:t>
+                        <a:t>https://www.posterpresentations.com/helpdesk.html</a:t>
                       </a:r>
                       <a:endParaRPr lang="en-US" sz="16400" dirty="0"/>
                     </a:p>
@@ -12141,7 +12080,7 @@
           <a:lstStyle/>
           <a:p>
             <a:pPr algn="ctr"/>
-            <a:endParaRPr lang="en-US" sz="6026"/>
+            <a:endParaRPr lang="en-US" sz="6026" dirty="0"/>
           </a:p>
         </p:txBody>
       </p:sp>
@@ -12214,7 +12153,7 @@
           <a:lstStyle/>
           <a:p>
             <a:pPr algn="ctr"/>
-            <a:endParaRPr lang="en-US" sz="6026"/>
+            <a:endParaRPr lang="en-US" sz="6026" dirty="0"/>
           </a:p>
         </p:txBody>
       </p:sp>
@@ -12684,7 +12623,7 @@
           <a:p>
             <a:fld id="{34A43A2E-6632-4F9D-8728-2CF59ACBBE60}" type="datetimeFigureOut">
               <a:rPr lang="en-US" dirty="0"/>
-              <a:t>2/12/2020</a:t>
+              <a:t>2/13/2020</a:t>
             </a:fld>
             <a:endParaRPr lang="en-US" dirty="0"/>
           </a:p>
@@ -13005,7 +12944,7 @@
           <a:lstStyle/>
           <a:p>
             <a:pPr algn="ctr"/>
-            <a:endParaRPr lang="en-US" sz="6026"/>
+            <a:endParaRPr lang="en-US" sz="6026" dirty="0"/>
           </a:p>
         </p:txBody>
       </p:sp>
@@ -13078,7 +13017,7 @@
           <a:lstStyle/>
           <a:p>
             <a:pPr algn="ctr"/>
-            <a:endParaRPr lang="en-US" sz="6026"/>
+            <a:endParaRPr lang="en-US" sz="6026" dirty="0"/>
           </a:p>
         </p:txBody>
       </p:sp>
@@ -13969,7 +13908,7 @@
         </p:nvSpPr>
         <p:spPr>
           <a:xfrm>
-            <a:off x="508004" y="6048000"/>
+            <a:off x="456726" y="5951602"/>
             <a:ext cx="14381953" cy="646331"/>
           </a:xfrm>
           <a:custGeom>
@@ -14117,7 +14056,7 @@
         </p:nvSpPr>
         <p:spPr>
           <a:xfrm>
-            <a:off x="547696" y="12204397"/>
+            <a:off x="547696" y="11208965"/>
             <a:ext cx="14381953" cy="646331"/>
           </a:xfrm>
           <a:custGeom>
@@ -14265,7 +14204,7 @@
         </p:nvSpPr>
         <p:spPr>
           <a:xfrm>
-            <a:off x="468310" y="15896855"/>
+            <a:off x="468310" y="14774423"/>
             <a:ext cx="14401801" cy="646331"/>
           </a:xfrm>
           <a:custGeom>
@@ -14424,7 +14363,7 @@
         </p:nvSpPr>
         <p:spPr>
           <a:xfrm>
-            <a:off x="15317608" y="18291716"/>
+            <a:off x="15265714" y="5989805"/>
             <a:ext cx="14401801" cy="590675"/>
           </a:xfrm>
           <a:custGeom>
@@ -14565,7 +14504,7 @@
         </p:nvSpPr>
         <p:spPr>
           <a:xfrm>
-            <a:off x="15557499" y="24644723"/>
+            <a:off x="15368924" y="30715478"/>
             <a:ext cx="14401801" cy="590675"/>
           </a:xfrm>
           <a:custGeom>
@@ -14706,8 +14645,8 @@
         </p:nvSpPr>
         <p:spPr>
           <a:xfrm>
-            <a:off x="15317608" y="37746166"/>
-            <a:ext cx="14418375" cy="1446550"/>
+            <a:off x="15317608" y="38041136"/>
+            <a:ext cx="14418375" cy="1292662"/>
           </a:xfrm>
         </p:spPr>
         <p:txBody>
@@ -14719,7 +14658,7 @@
                 <a:spcPct val="100000"/>
               </a:lnSpc>
               <a:spcBef>
-                <a:spcPts val="1200"/>
+                <a:spcPts val="0"/>
               </a:spcBef>
             </a:pPr>
             <a:r>
@@ -14730,34 +14669,7 @@
                 <a:latin typeface="Arial" panose="020B0604020202020204" pitchFamily="34" charset="0"/>
                 <a:cs typeface="Arial" panose="020B0604020202020204" pitchFamily="34" charset="0"/>
               </a:rPr>
-              <a:t>von Elm, E., et al.(2007). BMJ, 335 (7624), 806–808. </a:t>
-            </a:r>
-            <a:r>
-              <a:rPr lang="en-GB" sz="1800" dirty="0">
-                <a:solidFill>
-                  <a:schemeClr val="tx1"/>
-                </a:solidFill>
-                <a:latin typeface="Arial" panose="020B0604020202020204" pitchFamily="34" charset="0"/>
-                <a:cs typeface="Arial" panose="020B0604020202020204" pitchFamily="34" charset="0"/>
-                <a:hlinkClick r:id="rId3">
-                  <a:extLst>
-                    <a:ext uri="{A12FA001-AC4F-418D-AE19-62706E023703}">
-                      <ahyp:hlinkClr xmlns:ahyp="http://schemas.microsoft.com/office/drawing/2018/hyperlinkcolor" val="tx"/>
-                    </a:ext>
-                  </a:extLst>
-                </a:hlinkClick>
-              </a:rPr>
-              <a:t>https://doi.org/10.1136/bmj.39335.541782.AD</a:t>
-            </a:r>
-            <a:r>
-              <a:rPr lang="en-GB" sz="1800" dirty="0">
-                <a:solidFill>
-                  <a:schemeClr val="tx1"/>
-                </a:solidFill>
-                <a:latin typeface="Arial" panose="020B0604020202020204" pitchFamily="34" charset="0"/>
-                <a:cs typeface="Arial" panose="020B0604020202020204" pitchFamily="34" charset="0"/>
-              </a:rPr>
-              <a:t> </a:t>
+              <a:t>von Elm, E., et al.(2007). BMJ, 335 (7624), 806–808. https://doi.org/10.1136/bmj.39335.541782.AD </a:t>
             </a:r>
           </a:p>
           <a:p>
@@ -14766,7 +14678,7 @@
                 <a:spcPct val="100000"/>
               </a:lnSpc>
               <a:spcBef>
-                <a:spcPts val="1200"/>
+                <a:spcPts val="0"/>
               </a:spcBef>
             </a:pPr>
             <a:r>
@@ -14787,52 +14699,8 @@
                 <a:latin typeface="Arial" panose="020B0604020202020204" pitchFamily="34" charset="0"/>
                 <a:cs typeface="Arial" panose="020B0604020202020204" pitchFamily="34" charset="0"/>
               </a:rPr>
-              <a:t>. </a:t>
-            </a:r>
-            <a:r>
-              <a:rPr lang="en-GB" sz="1800" dirty="0" err="1">
-                <a:solidFill>
-                  <a:schemeClr val="tx1"/>
-                </a:solidFill>
-                <a:latin typeface="Arial" panose="020B0604020202020204" pitchFamily="34" charset="0"/>
-                <a:cs typeface="Arial" panose="020B0604020202020204" pitchFamily="34" charset="0"/>
-              </a:rPr>
-              <a:t>PLoS</a:t>
-            </a:r>
-            <a:r>
-              <a:rPr lang="en-GB" sz="1800" dirty="0">
-                <a:solidFill>
-                  <a:schemeClr val="tx1"/>
-                </a:solidFill>
-                <a:latin typeface="Arial" panose="020B0604020202020204" pitchFamily="34" charset="0"/>
-                <a:cs typeface="Arial" panose="020B0604020202020204" pitchFamily="34" charset="0"/>
-              </a:rPr>
-              <a:t> Med 6(7): e1000097. </a:t>
-            </a:r>
-            <a:r>
-              <a:rPr lang="en-GB" sz="1800" dirty="0">
-                <a:solidFill>
-                  <a:schemeClr val="tx1"/>
-                </a:solidFill>
-                <a:latin typeface="Arial" panose="020B0604020202020204" pitchFamily="34" charset="0"/>
-                <a:cs typeface="Arial" panose="020B0604020202020204" pitchFamily="34" charset="0"/>
-                <a:hlinkClick r:id="rId4">
-                  <a:extLst>
-                    <a:ext uri="{A12FA001-AC4F-418D-AE19-62706E023703}">
-                      <ahyp:hlinkClr xmlns:ahyp="http://schemas.microsoft.com/office/drawing/2018/hyperlinkcolor" val="tx"/>
-                    </a:ext>
-                  </a:extLst>
-                </a:hlinkClick>
-              </a:rPr>
-              <a:t>https://doi.org/10.1371/journal.pmed.1000097</a:t>
-            </a:r>
-            <a:endParaRPr lang="en-GB" sz="1800" dirty="0">
-              <a:solidFill>
-                <a:schemeClr val="tx1"/>
-              </a:solidFill>
-              <a:latin typeface="Arial" panose="020B0604020202020204" pitchFamily="34" charset="0"/>
-              <a:cs typeface="Arial" panose="020B0604020202020204" pitchFamily="34" charset="0"/>
-            </a:endParaRPr>
+              <a:t>. PLoS Med 6(7): e1000097. https://doi.org/10.1371/journal.pmed.1000097</a:t>
+            </a:r>
           </a:p>
         </p:txBody>
       </p:sp>
@@ -14854,20 +14722,21 @@
         </p:nvSpPr>
         <p:spPr>
           <a:xfrm>
-            <a:off x="15581832" y="25548475"/>
-            <a:ext cx="14401797" cy="3155223"/>
+            <a:off x="15372155" y="31347461"/>
+            <a:ext cx="14401797" cy="6458691"/>
           </a:xfrm>
         </p:spPr>
         <p:txBody>
           <a:bodyPr/>
           <a:lstStyle/>
           <a:p>
-            <a:pPr marL="571448" indent="-571448">
-              <a:buFont typeface="Arial" panose="020B0604020202020204" pitchFamily="34" charset="0"/>
-              <a:buChar char="•"/>
+            <a:pPr>
+              <a:spcBef>
+                <a:spcPts val="1800"/>
+              </a:spcBef>
             </a:pPr>
             <a:r>
-              <a:rPr lang="en-US" sz="3598" dirty="0">
+              <a:rPr lang="en-US" sz="3300" dirty="0">
                 <a:solidFill>
                   <a:schemeClr val="tx1"/>
                 </a:solidFill>
@@ -14878,85 +14747,54 @@
             </a:r>
           </a:p>
           <a:p>
-            <a:pPr marL="571448" indent="-571448">
-              <a:buFont typeface="Arial" panose="020B0604020202020204" pitchFamily="34" charset="0"/>
-              <a:buChar char="•"/>
+            <a:pPr>
+              <a:spcBef>
+                <a:spcPts val="1800"/>
+              </a:spcBef>
             </a:pPr>
             <a:r>
-              <a:rPr lang="en-US" sz="3598" dirty="0">
+              <a:rPr lang="en-US" sz="3300" dirty="0">
                 <a:solidFill>
                   <a:schemeClr val="tx1"/>
                 </a:solidFill>
                 <a:latin typeface="Arial" panose="020B0604020202020204" pitchFamily="34" charset="0"/>
                 <a:cs typeface="Arial" panose="020B0604020202020204" pitchFamily="34" charset="0"/>
               </a:rPr>
-              <a:t>Replication may be difficult given the lack of shared analysis code</a:t>
-            </a:r>
-            <a:r>
-              <a:rPr lang="en-US" sz="3598">
+              <a:t>Poor reporting on the UK Biobank’s funding sources and setting unlikely to be problematic since detailed information is publicly accessible elsewhere.</a:t>
+            </a:r>
+          </a:p>
+          <a:p>
+            <a:pPr>
+              <a:spcBef>
+                <a:spcPts val="1800"/>
+              </a:spcBef>
+            </a:pPr>
+            <a:r>
+              <a:rPr lang="en-US" sz="3300" dirty="0">
                 <a:solidFill>
                   <a:schemeClr val="tx1"/>
                 </a:solidFill>
                 <a:latin typeface="Arial" panose="020B0604020202020204" pitchFamily="34" charset="0"/>
                 <a:cs typeface="Arial" panose="020B0604020202020204" pitchFamily="34" charset="0"/>
               </a:rPr>
-              <a:t>, </a:t>
-            </a:r>
-            <a:endParaRPr lang="en-US" sz="3598" dirty="0">
-              <a:solidFill>
-                <a:schemeClr val="tx1"/>
-              </a:solidFill>
-              <a:latin typeface="Arial" panose="020B0604020202020204" pitchFamily="34" charset="0"/>
-              <a:cs typeface="Arial" panose="020B0604020202020204" pitchFamily="34" charset="0"/>
-            </a:endParaRPr>
-          </a:p>
-        </p:txBody>
-      </p:sp>
-      <p:sp>
-        <p:nvSpPr>
-          <p:cNvPr id="15" name="Text Placeholder 14">
-            <a:extLst>
-              <a:ext uri="{FF2B5EF4-FFF2-40B4-BE49-F238E27FC236}">
-                <a16:creationId xmlns:a16="http://schemas.microsoft.com/office/drawing/2014/main" id="{4EA47521-DC3B-FD48-BEDF-63ED67CCF6E6}"/>
-              </a:ext>
-            </a:extLst>
-          </p:cNvPr>
-          <p:cNvSpPr>
-            <a:spLocks noGrp="1"/>
-          </p:cNvSpPr>
-          <p:nvPr>
-            <p:ph type="body" sz="quarter" idx="31"/>
-          </p:nvPr>
-        </p:nvSpPr>
-        <p:spPr>
-          <a:xfrm>
-            <a:off x="15405105" y="7080873"/>
-            <a:ext cx="14401797" cy="3730252"/>
-          </a:xfrm>
-        </p:spPr>
-        <p:txBody>
-          <a:bodyPr/>
-          <a:lstStyle/>
-          <a:p>
-            <a:r>
-              <a:rPr lang="en-GB" sz="3600" dirty="0">
+              <a:t>Good reporting of statistical methods will aid replications of the main results. Comparing replication results to the original may be difficult given the poor reporting of unadjusted results. The lack of shared code will also make replications more difficult.</a:t>
+            </a:r>
+          </a:p>
+          <a:p>
+            <a:pPr>
+              <a:spcBef>
+                <a:spcPts val="1800"/>
+              </a:spcBef>
+            </a:pPr>
+            <a:r>
+              <a:rPr lang="en-US" sz="3300" dirty="0">
                 <a:solidFill>
                   <a:schemeClr val="tx1"/>
                 </a:solidFill>
                 <a:latin typeface="Arial" panose="020B0604020202020204" pitchFamily="34" charset="0"/>
                 <a:cs typeface="Arial" panose="020B0604020202020204" pitchFamily="34" charset="0"/>
               </a:rPr>
-              <a:t>The data here are from 32 articles KD assessed</a:t>
-            </a:r>
-            <a:r>
-              <a:rPr lang="en-US" sz="3600" dirty="0">
-                <a:solidFill>
-                  <a:schemeClr val="tx1"/>
-                </a:solidFill>
-                <a:latin typeface="Arial" panose="020B0604020202020204" pitchFamily="34" charset="0"/>
-                <a:cs typeface="Arial" panose="020B0604020202020204" pitchFamily="34" charset="0"/>
-              </a:rPr>
-              <a:t>. They may change after duplicate extraction. Designs include 2 case-control, 11 cohort,18 cross-sectional and 1 with cohort and cross-sectional analyses. 27 had UK based corresponding authors with the other 5 across different countries. 4 articles were published in 2014, 4 in 2015, 8 in 2016, 13 in 2018 and 1 in 2019. </a:t>
+              <a:t>Introduction sections often included discussion of confounders, but authors rarely gave explicit justification for their inclusion.</a:t>
             </a:r>
           </a:p>
         </p:txBody>
@@ -14980,7 +14818,7 @@
         <p:spPr>
           <a:xfrm>
             <a:off x="468310" y="6605085"/>
-            <a:ext cx="14401797" cy="5823133"/>
+            <a:ext cx="14401797" cy="4929042"/>
           </a:xfrm>
         </p:spPr>
         <p:txBody>
@@ -14988,31 +14826,19 @@
           <a:lstStyle/>
           <a:p>
             <a:r>
-              <a:rPr lang="en-GB" sz="3400" dirty="0">
+              <a:rPr lang="en-GB" sz="3300" dirty="0">
                 <a:solidFill>
                   <a:schemeClr val="tx1"/>
                 </a:solidFill>
                 <a:latin typeface="Arial" panose="020B0604020202020204" pitchFamily="34" charset="0"/>
                 <a:cs typeface="Arial" panose="020B0604020202020204" pitchFamily="34" charset="0"/>
               </a:rPr>
-              <a:t>The UK Biobank (https://www.ukbiobank.ac.uk/) is a prospective cohort study of over 500,000 people. It is available, at a cost, to researchers conducting research in the public interest.</a:t>
-            </a:r>
-          </a:p>
-          <a:p>
-            <a:r>
-              <a:rPr lang="en-GB" sz="3400" dirty="0">
-                <a:solidFill>
-                  <a:schemeClr val="tx1"/>
-                </a:solidFill>
-                <a:latin typeface="Arial" panose="020B0604020202020204" pitchFamily="34" charset="0"/>
-                <a:cs typeface="Arial" panose="020B0604020202020204" pitchFamily="34" charset="0"/>
-              </a:rPr>
-              <a:t>Data sharing like the UK Biobank offers researchers new opportunities but the impact it will have on the reliability of research findings is uncertain.</a:t>
-            </a:r>
-          </a:p>
-          <a:p>
-            <a:r>
-              <a:rPr lang="en-GB" sz="3400" dirty="0">
+              <a:t>The UK Biobank (https://www.ukbiobank.ac.uk/) is a prospective cohort study of over 500,000 people. It is available, at a cost, to researchers conducting research in the public interest. Data sharing like the UK Biobank offers researchers new opportunities but its impact on the reliability of research findings is uncertain.</a:t>
+            </a:r>
+          </a:p>
+          <a:p>
+            <a:r>
+              <a:rPr lang="en-GB" sz="3300" dirty="0">
                 <a:solidFill>
                   <a:schemeClr val="tx1"/>
                 </a:solidFill>
@@ -15042,8 +14868,8 @@
         </p:nvSpPr>
         <p:spPr>
           <a:xfrm>
-            <a:off x="498081" y="12683508"/>
-            <a:ext cx="14401797" cy="3578416"/>
+            <a:off x="498081" y="11688076"/>
+            <a:ext cx="14401797" cy="3231654"/>
           </a:xfrm>
         </p:spPr>
         <p:txBody>
@@ -15051,11 +14877,17 @@
           <a:lstStyle/>
           <a:p>
             <a:pPr marL="742950" indent="-742950">
+              <a:lnSpc>
+                <a:spcPct val="100000"/>
+              </a:lnSpc>
+              <a:spcBef>
+                <a:spcPts val="1800"/>
+              </a:spcBef>
               <a:buFont typeface="+mj-lt"/>
               <a:buAutoNum type="arabicPeriod"/>
             </a:pPr>
             <a:r>
-              <a:rPr lang="en-GB" sz="3400" dirty="0">
+              <a:rPr lang="en-GB" sz="3300" dirty="0">
                 <a:solidFill>
                   <a:schemeClr val="tx1"/>
                 </a:solidFill>
@@ -15067,11 +14899,17 @@
           </a:p>
           <a:p>
             <a:pPr marL="742950" indent="-742950">
+              <a:lnSpc>
+                <a:spcPct val="100000"/>
+              </a:lnSpc>
+              <a:spcBef>
+                <a:spcPts val="1800"/>
+              </a:spcBef>
               <a:buFont typeface="+mj-lt"/>
               <a:buAutoNum type="arabicPeriod"/>
             </a:pPr>
             <a:r>
-              <a:rPr lang="en-GB" sz="3400" dirty="0">
+              <a:rPr lang="en-GB" sz="3300" dirty="0">
                 <a:solidFill>
                   <a:schemeClr val="tx1"/>
                 </a:solidFill>
@@ -15083,11 +14921,17 @@
           </a:p>
           <a:p>
             <a:pPr marL="742950" indent="-742950">
+              <a:lnSpc>
+                <a:spcPct val="100000"/>
+              </a:lnSpc>
+              <a:spcBef>
+                <a:spcPts val="1800"/>
+              </a:spcBef>
               <a:buFont typeface="+mj-lt"/>
               <a:buAutoNum type="arabicPeriod"/>
             </a:pPr>
             <a:r>
-              <a:rPr lang="en-GB" sz="3400" dirty="0">
+              <a:rPr lang="en-GB" sz="3300" dirty="0">
                 <a:solidFill>
                   <a:schemeClr val="tx1"/>
                 </a:solidFill>
@@ -15096,7 +14940,7 @@
               </a:rPr>
               <a:t>inform reporting guidelines for other articles using the UK Biobank and similar resources.</a:t>
             </a:r>
-            <a:endParaRPr lang="en-US" sz="3400" dirty="0">
+            <a:endParaRPr lang="en-US" sz="3300" dirty="0">
               <a:solidFill>
                 <a:schemeClr val="tx1"/>
               </a:solidFill>
@@ -15124,7 +14968,7 @@
         </p:nvSpPr>
         <p:spPr>
           <a:xfrm>
-            <a:off x="547696" y="16405163"/>
+            <a:off x="547696" y="15282731"/>
             <a:ext cx="14401797" cy="2622256"/>
           </a:xfrm>
         </p:spPr>
@@ -15133,7 +14977,7 @@
           <a:lstStyle/>
           <a:p>
             <a:r>
-              <a:rPr lang="en-GB" sz="3400" dirty="0">
+              <a:rPr lang="en-GB" sz="3300" dirty="0">
                 <a:solidFill>
                   <a:schemeClr val="tx1"/>
                 </a:solidFill>
@@ -15408,17 +15252,7 @@
                 <a:latin typeface="Arial" panose="020B0604020202020204" pitchFamily="34" charset="0"/>
                 <a:cs typeface="Arial" panose="020B0604020202020204" pitchFamily="34" charset="0"/>
               </a:rPr>
-              <a:t>@</a:t>
-            </a:r>
-            <a:r>
-              <a:rPr lang="en-GB" sz="3002" dirty="0" err="1">
-                <a:solidFill>
-                  <a:schemeClr val="tx1"/>
-                </a:solidFill>
-                <a:latin typeface="Arial" panose="020B0604020202020204" pitchFamily="34" charset="0"/>
-                <a:cs typeface="Arial" panose="020B0604020202020204" pitchFamily="34" charset="0"/>
-              </a:rPr>
-              <a:t>katiedrax</a:t>
+              <a:t>@katiedrax	            </a:t>
             </a:r>
             <a:r>
               <a:rPr lang="en-GB" sz="3002" dirty="0">
@@ -15427,17 +15261,7 @@
                 </a:solidFill>
                 <a:latin typeface="Arial" panose="020B0604020202020204" pitchFamily="34" charset="0"/>
                 <a:cs typeface="Arial" panose="020B0604020202020204" pitchFamily="34" charset="0"/>
-              </a:rPr>
-              <a:t>	            </a:t>
-            </a:r>
-            <a:r>
-              <a:rPr lang="en-GB" sz="3002" dirty="0">
-                <a:solidFill>
-                  <a:schemeClr val="tx1"/>
-                </a:solidFill>
-                <a:latin typeface="Arial" panose="020B0604020202020204" pitchFamily="34" charset="0"/>
-                <a:cs typeface="Arial" panose="020B0604020202020204" pitchFamily="34" charset="0"/>
-                <a:hlinkClick r:id="rId5">
+                <a:hlinkClick r:id="rId3">
                   <a:extLst>
                     <a:ext uri="{A12FA001-AC4F-418D-AE19-62706E023703}">
                       <ahyp:hlinkClr xmlns:ahyp="http://schemas.microsoft.com/office/drawing/2018/hyperlinkcolor" val="tx"/>
@@ -15475,7 +15299,7 @@
           <p:nvPr/>
         </p:nvPicPr>
         <p:blipFill>
-          <a:blip r:embed="rId6" cstate="print">
+          <a:blip r:embed="rId4" cstate="print">
             <a:extLst>
               <a:ext uri="{28A0092B-C50C-407E-A947-70E740481C1C}">
                 <a14:useLocalDpi xmlns:a14="http://schemas.microsoft.com/office/drawing/2010/main" val="0"/>
@@ -15522,7 +15346,7 @@
           <p:nvPr/>
         </p:nvPicPr>
         <p:blipFill rotWithShape="1">
-          <a:blip r:embed="rId7" cstate="print">
+          <a:blip r:embed="rId5" cstate="print">
             <a:extLst>
               <a:ext uri="{28A0092B-C50C-407E-A947-70E740481C1C}">
                 <a14:useLocalDpi xmlns:a14="http://schemas.microsoft.com/office/drawing/2010/main" val="0"/>
@@ -15567,7 +15391,7 @@
           <p:nvPr/>
         </p:nvPicPr>
         <p:blipFill>
-          <a:blip r:embed="rId8" cstate="print">
+          <a:blip r:embed="rId6" cstate="print">
             <a:extLst>
               <a:ext uri="{28A0092B-C50C-407E-A947-70E740481C1C}">
                 <a14:useLocalDpi xmlns:a14="http://schemas.microsoft.com/office/drawing/2010/main" val="0"/>
@@ -15612,7 +15436,7 @@
           <p:nvPr/>
         </p:nvPicPr>
         <p:blipFill>
-          <a:blip r:embed="rId9">
+          <a:blip r:embed="rId7">
             <a:extLst>
               <a:ext uri="{28A0092B-C50C-407E-A947-70E740481C1C}">
                 <a14:useLocalDpi xmlns:a14="http://schemas.microsoft.com/office/drawing/2010/main" val="0"/>
@@ -15626,7 +15450,7 @@
         </p:blipFill>
         <p:spPr bwMode="auto">
           <a:xfrm>
-            <a:off x="4017674" y="41614255"/>
+            <a:off x="4213379" y="41614255"/>
             <a:ext cx="2847976" cy="1122165"/>
           </a:xfrm>
           <a:prstGeom prst="rect">
@@ -15638,26 +15462,24 @@
           </a:ln>
         </p:spPr>
       </p:pic>
-      <p:cxnSp>
-        <p:nvCxnSpPr>
-          <p:cNvPr id="75" name="AutoShape 2">
+      <p:sp>
+        <p:nvSpPr>
+          <p:cNvPr id="76" name="Rectangle 75">
             <a:extLst>
               <a:ext uri="{FF2B5EF4-FFF2-40B4-BE49-F238E27FC236}">
-                <a16:creationId xmlns:a16="http://schemas.microsoft.com/office/drawing/2014/main" id="{41CC81D7-149A-431B-AF49-8A81DB28BCF4}"/>
+                <a16:creationId xmlns:a16="http://schemas.microsoft.com/office/drawing/2014/main" id="{FEB947B7-724D-4557-9FF1-5342EB094B26}"/>
               </a:ext>
             </a:extLst>
           </p:cNvPr>
-          <p:cNvCxnSpPr>
-            <a:cxnSpLocks noChangeShapeType="1"/>
-          </p:cNvCxnSpPr>
+          <p:cNvSpPr/>
           <p:nvPr/>
-        </p:nvCxnSpPr>
-        <p:spPr bwMode="auto">
-          <a:xfrm flipH="1">
-            <a:off x="5083451" y="19758348"/>
-            <a:ext cx="6" cy="350991"/>
+        </p:nvSpPr>
+        <p:spPr>
+          <a:xfrm>
+            <a:off x="1130421" y="17796733"/>
+            <a:ext cx="8406557" cy="584775"/>
           </a:xfrm>
-          <a:prstGeom prst="straightConnector1">
+          <a:prstGeom prst="rect">
             <a:avLst/>
           </a:prstGeom>
           <a:gradFill flip="none" rotWithShape="1">
@@ -15681,86 +15503,25 @@
                 </a:srgbClr>
               </a:gs>
             </a:gsLst>
-            <a:path path="circle">
-              <a:fillToRect t="100000" r="100000"/>
-            </a:path>
-            <a:tileRect l="-100000" b="-100000"/>
-          </a:gradFill>
-          <a:ln w="57150">
-            <a:solidFill>
-              <a:srgbClr val="000000"/>
-            </a:solidFill>
-            <a:round/>
-            <a:headEnd/>
-            <a:tailEnd type="triangle" w="med" len="med"/>
-          </a:ln>
-          <a:effectLst/>
-          <a:extLst>
-            <a:ext uri="{909E8E84-426E-40DD-AFC4-6F175D3DCCD1}">
-              <a14:hiddenFill xmlns:a14="http://schemas.microsoft.com/office/drawing/2010/main">
-                <a:noFill/>
-              </a14:hiddenFill>
-            </a:ext>
-            <a:ext uri="{AF507438-7753-43E0-B8FC-AC1667EBCBE1}">
-              <a14:hiddenEffects xmlns:a14="http://schemas.microsoft.com/office/drawing/2010/main">
-                <a:effectLst>
-                  <a:outerShdw dist="35921" dir="2700000" algn="ctr" rotWithShape="0">
-                    <a:srgbClr val="CCCCCC"/>
-                  </a:outerShdw>
-                </a:effectLst>
-              </a14:hiddenEffects>
-            </a:ext>
-          </a:extLst>
-        </p:spPr>
-      </p:cxnSp>
-      <p:sp>
-        <p:nvSpPr>
-          <p:cNvPr id="76" name="Rectangle 75">
-            <a:extLst>
-              <a:ext uri="{FF2B5EF4-FFF2-40B4-BE49-F238E27FC236}">
-                <a16:creationId xmlns:a16="http://schemas.microsoft.com/office/drawing/2014/main" id="{FEB947B7-724D-4557-9FF1-5342EB094B26}"/>
-              </a:ext>
-            </a:extLst>
-          </p:cNvPr>
-          <p:cNvSpPr/>
-          <p:nvPr/>
-        </p:nvSpPr>
-        <p:spPr>
-          <a:xfrm>
-            <a:off x="1457070" y="19056318"/>
-            <a:ext cx="8406557" cy="584775"/>
-          </a:xfrm>
-          <a:prstGeom prst="rect">
-            <a:avLst/>
-          </a:prstGeom>
-          <a:gradFill flip="none" rotWithShape="1">
-            <a:gsLst>
-              <a:gs pos="0">
-                <a:srgbClr val="FFFF19">
-                  <a:tint val="66000"/>
-                  <a:satMod val="160000"/>
-                </a:srgbClr>
-              </a:gs>
-              <a:gs pos="50000">
-                <a:srgbClr val="FFFF19">
-                  <a:tint val="44500"/>
-                  <a:satMod val="160000"/>
-                </a:srgbClr>
-              </a:gs>
-              <a:gs pos="100000">
-                <a:srgbClr val="FFFF19">
-                  <a:tint val="23500"/>
-                  <a:satMod val="160000"/>
-                </a:srgbClr>
-              </a:gs>
-            </a:gsLst>
-            <a:lin ang="10800000" scaled="1"/>
+            <a:lin ang="5400000" scaled="1"/>
             <a:tileRect/>
           </a:gradFill>
-          <a:ln w="3175" cap="rnd">
-            <a:noFill/>
-          </a:ln>
+          <a:ln/>
         </p:spPr>
+        <p:style>
+          <a:lnRef idx="1">
+            <a:schemeClr val="accent1"/>
+          </a:lnRef>
+          <a:fillRef idx="2">
+            <a:schemeClr val="accent1"/>
+          </a:fillRef>
+          <a:effectRef idx="1">
+            <a:schemeClr val="accent1"/>
+          </a:effectRef>
+          <a:fontRef idx="minor">
+            <a:schemeClr val="dk1"/>
+          </a:fontRef>
+        </p:style>
         <p:txBody>
           <a:bodyPr wrap="square">
             <a:spAutoFit/>
@@ -15809,73 +15570,10 @@
         </p:nvSpPr>
         <p:spPr>
           <a:xfrm>
-            <a:off x="1817389" y="20190436"/>
+            <a:off x="2245194" y="18835388"/>
             <a:ext cx="6060255" cy="1077218"/>
           </a:xfrm>
           <a:prstGeom prst="rect">
-            <a:avLst/>
-          </a:prstGeom>
-          <a:solidFill>
-            <a:srgbClr val="FFFF19"/>
-          </a:solidFill>
-          <a:ln>
-            <a:noFill/>
-          </a:ln>
-        </p:spPr>
-        <p:txBody>
-          <a:bodyPr wrap="square">
-            <a:spAutoFit/>
-          </a:bodyPr>
-          <a:lstStyle/>
-          <a:p>
-            <a:pPr algn="ctr">
-              <a:spcAft>
-                <a:spcPts val="0"/>
-              </a:spcAft>
-            </a:pPr>
-            <a:r>
-              <a:rPr lang="en-CA" sz="3200" kern="1400" dirty="0">
-                <a:solidFill>
-                  <a:srgbClr val="000000"/>
-                </a:solidFill>
-                <a:latin typeface="Arial" panose="020B0604020202020204" pitchFamily="34" charset="0"/>
-                <a:ea typeface="Times New Roman" panose="02020603050405020304" pitchFamily="18" charset="0"/>
-                <a:cs typeface="Arial" panose="020B0604020202020204" pitchFamily="34" charset="0"/>
-              </a:rPr>
-              <a:t>Deduplicated records screened (n =   1233)</a:t>
-            </a:r>
-            <a:endParaRPr lang="en-GB" sz="3200" kern="1400" dirty="0">
-              <a:solidFill>
-                <a:srgbClr val="000000"/>
-              </a:solidFill>
-              <a:effectLst/>
-              <a:latin typeface="Arial" panose="020B0604020202020204" pitchFamily="34" charset="0"/>
-              <a:ea typeface="Times New Roman" panose="02020603050405020304" pitchFamily="18" charset="0"/>
-              <a:cs typeface="Arial" panose="020B0604020202020204" pitchFamily="34" charset="0"/>
-            </a:endParaRPr>
-          </a:p>
-        </p:txBody>
-      </p:sp>
-      <p:cxnSp>
-        <p:nvCxnSpPr>
-          <p:cNvPr id="79" name="AutoShape 5">
-            <a:extLst>
-              <a:ext uri="{FF2B5EF4-FFF2-40B4-BE49-F238E27FC236}">
-                <a16:creationId xmlns:a16="http://schemas.microsoft.com/office/drawing/2014/main" id="{C105A21A-0522-453C-AE3D-15E11966A250}"/>
-              </a:ext>
-            </a:extLst>
-          </p:cNvPr>
-          <p:cNvCxnSpPr>
-            <a:cxnSpLocks noChangeShapeType="1"/>
-          </p:cNvCxnSpPr>
-          <p:nvPr/>
-        </p:nvCxnSpPr>
-        <p:spPr bwMode="auto">
-          <a:xfrm>
-            <a:off x="5688314" y="21434050"/>
-            <a:ext cx="2871960" cy="0"/>
-          </a:xfrm>
-          <a:prstGeom prst="straightConnector1">
             <a:avLst/>
           </a:prstGeom>
           <a:gradFill flip="none" rotWithShape="1">
@@ -15899,31 +15597,59 @@
                 </a:srgbClr>
               </a:gs>
             </a:gsLst>
-            <a:path path="circle">
-              <a:fillToRect t="100000" r="100000"/>
-            </a:path>
-            <a:tileRect l="-100000" b="-100000"/>
+            <a:lin ang="5400000" scaled="1"/>
+            <a:tileRect/>
           </a:gradFill>
-          <a:ln w="38100">
-            <a:headEnd/>
-            <a:tailEnd type="triangle" w="med" len="med"/>
-          </a:ln>
+          <a:ln/>
         </p:spPr>
         <p:style>
           <a:lnRef idx="1">
-            <a:schemeClr val="dk1"/>
+            <a:schemeClr val="accent1"/>
           </a:lnRef>
-          <a:fillRef idx="0">
-            <a:schemeClr val="dk1"/>
+          <a:fillRef idx="2">
+            <a:schemeClr val="accent1"/>
           </a:fillRef>
-          <a:effectRef idx="0">
-            <a:schemeClr val="dk1"/>
+          <a:effectRef idx="1">
+            <a:schemeClr val="accent1"/>
           </a:effectRef>
           <a:fontRef idx="minor">
-            <a:schemeClr val="tx1"/>
+            <a:schemeClr val="dk1"/>
           </a:fontRef>
         </p:style>
-      </p:cxnSp>
+        <p:txBody>
+          <a:bodyPr wrap="square">
+            <a:spAutoFit/>
+          </a:bodyPr>
+          <a:lstStyle/>
+          <a:p>
+            <a:pPr algn="ctr">
+              <a:spcAft>
+                <a:spcPts val="0"/>
+              </a:spcAft>
+            </a:pPr>
+            <a:r>
+              <a:rPr lang="en-CA" sz="3200" kern="1400" dirty="0">
+                <a:solidFill>
+                  <a:srgbClr val="000000"/>
+                </a:solidFill>
+                <a:latin typeface="Arial" panose="020B0604020202020204" pitchFamily="34" charset="0"/>
+                <a:ea typeface="Times New Roman" panose="02020603050405020304" pitchFamily="18" charset="0"/>
+                <a:cs typeface="Arial" panose="020B0604020202020204" pitchFamily="34" charset="0"/>
+              </a:rPr>
+              <a:t>Deduplicated records screened (n =   1233)</a:t>
+            </a:r>
+            <a:endParaRPr lang="en-GB" sz="3200" kern="1400" dirty="0">
+              <a:solidFill>
+                <a:srgbClr val="000000"/>
+              </a:solidFill>
+              <a:effectLst/>
+              <a:latin typeface="Arial" panose="020B0604020202020204" pitchFamily="34" charset="0"/>
+              <a:ea typeface="Times New Roman" panose="02020603050405020304" pitchFamily="18" charset="0"/>
+              <a:cs typeface="Arial" panose="020B0604020202020204" pitchFamily="34" charset="0"/>
+            </a:endParaRPr>
+          </a:p>
+        </p:txBody>
+      </p:sp>
       <p:sp>
         <p:nvSpPr>
           <p:cNvPr id="80" name="Rectangle 79">
@@ -15938,474 +15664,10 @@
         </p:nvSpPr>
         <p:spPr>
           <a:xfrm>
-            <a:off x="8764375" y="20457408"/>
-            <a:ext cx="5154741" cy="1077218"/>
+            <a:off x="8972432" y="18832640"/>
+            <a:ext cx="5154742" cy="1077218"/>
           </a:xfrm>
           <a:prstGeom prst="rect">
-            <a:avLst/>
-          </a:prstGeom>
-          <a:solidFill>
-            <a:srgbClr val="FFFF19"/>
-          </a:solidFill>
-          <a:ln cap="rnd">
-            <a:noFill/>
-          </a:ln>
-          <a:effectLst>
-            <a:softEdge rad="0"/>
-          </a:effectLst>
-        </p:spPr>
-        <p:txBody>
-          <a:bodyPr wrap="square">
-            <a:spAutoFit/>
-          </a:bodyPr>
-          <a:lstStyle/>
-          <a:p>
-            <a:pPr algn="ctr">
-              <a:spcAft>
-                <a:spcPts val="0"/>
-              </a:spcAft>
-            </a:pPr>
-            <a:r>
-              <a:rPr lang="en-CA" sz="3200" kern="1400" dirty="0">
-                <a:solidFill>
-                  <a:srgbClr val="000000"/>
-                </a:solidFill>
-                <a:latin typeface="Arial" panose="020B0604020202020204" pitchFamily="34" charset="0"/>
-                <a:ea typeface="Times New Roman" panose="02020603050405020304" pitchFamily="18" charset="0"/>
-                <a:cs typeface="Arial" panose="020B0604020202020204" pitchFamily="34" charset="0"/>
-              </a:rPr>
-              <a:t>Records excluded </a:t>
-            </a:r>
-          </a:p>
-          <a:p>
-            <a:pPr algn="ctr">
-              <a:spcAft>
-                <a:spcPts val="0"/>
-              </a:spcAft>
-            </a:pPr>
-            <a:r>
-              <a:rPr lang="en-CA" sz="3200" kern="1400" dirty="0">
-                <a:solidFill>
-                  <a:srgbClr val="000000"/>
-                </a:solidFill>
-                <a:latin typeface="Arial" panose="020B0604020202020204" pitchFamily="34" charset="0"/>
-                <a:ea typeface="Times New Roman" panose="02020603050405020304" pitchFamily="18" charset="0"/>
-                <a:cs typeface="Arial" panose="020B0604020202020204" pitchFamily="34" charset="0"/>
-              </a:rPr>
-              <a:t>(n = 475)</a:t>
-            </a:r>
-            <a:endParaRPr lang="en-GB" sz="3200" kern="1400" dirty="0">
-              <a:solidFill>
-                <a:srgbClr val="000000"/>
-              </a:solidFill>
-              <a:latin typeface="Arial" panose="020B0604020202020204" pitchFamily="34" charset="0"/>
-              <a:ea typeface="Times New Roman" panose="02020603050405020304" pitchFamily="18" charset="0"/>
-              <a:cs typeface="Arial" panose="020B0604020202020204" pitchFamily="34" charset="0"/>
-            </a:endParaRPr>
-          </a:p>
-        </p:txBody>
-      </p:sp>
-      <p:sp>
-        <p:nvSpPr>
-          <p:cNvPr id="81" name="Rectangle 80">
-            <a:extLst>
-              <a:ext uri="{FF2B5EF4-FFF2-40B4-BE49-F238E27FC236}">
-                <a16:creationId xmlns:a16="http://schemas.microsoft.com/office/drawing/2014/main" id="{B6D224EC-48B2-4F21-9BB7-4B47D2F7BE45}"/>
-              </a:ext>
-            </a:extLst>
-          </p:cNvPr>
-          <p:cNvSpPr/>
-          <p:nvPr/>
-        </p:nvSpPr>
-        <p:spPr>
-          <a:xfrm>
-            <a:off x="1848942" y="21815916"/>
-            <a:ext cx="6351271" cy="1077218"/>
-          </a:xfrm>
-          <a:prstGeom prst="rect">
-            <a:avLst/>
-          </a:prstGeom>
-          <a:solidFill>
-            <a:srgbClr val="FFFF19"/>
-          </a:solidFill>
-          <a:ln cap="rnd">
-            <a:noFill/>
-          </a:ln>
-          <a:effectLst>
-            <a:softEdge rad="0"/>
-          </a:effectLst>
-        </p:spPr>
-        <p:txBody>
-          <a:bodyPr wrap="square">
-            <a:spAutoFit/>
-          </a:bodyPr>
-          <a:lstStyle/>
-          <a:p>
-            <a:pPr algn="ctr">
-              <a:spcAft>
-                <a:spcPts val="0"/>
-              </a:spcAft>
-            </a:pPr>
-            <a:r>
-              <a:rPr lang="en-CA" sz="3200" kern="1400" dirty="0">
-                <a:solidFill>
-                  <a:srgbClr val="000000"/>
-                </a:solidFill>
-                <a:latin typeface="Arial" panose="020B0604020202020204" pitchFamily="34" charset="0"/>
-                <a:ea typeface="Times New Roman" panose="02020603050405020304" pitchFamily="18" charset="0"/>
-                <a:cs typeface="Arial" panose="020B0604020202020204" pitchFamily="34" charset="0"/>
-              </a:rPr>
-              <a:t>Full-text articles assessed for eligibility (n =  758)</a:t>
-            </a:r>
-            <a:endParaRPr lang="en-GB" sz="3200" kern="1400" dirty="0">
-              <a:solidFill>
-                <a:srgbClr val="000000"/>
-              </a:solidFill>
-              <a:effectLst/>
-              <a:latin typeface="Arial" panose="020B0604020202020204" pitchFamily="34" charset="0"/>
-              <a:ea typeface="Times New Roman" panose="02020603050405020304" pitchFamily="18" charset="0"/>
-              <a:cs typeface="Arial" panose="020B0604020202020204" pitchFamily="34" charset="0"/>
-            </a:endParaRPr>
-          </a:p>
-        </p:txBody>
-      </p:sp>
-      <p:sp>
-        <p:nvSpPr>
-          <p:cNvPr id="82" name="Rectangle 81">
-            <a:extLst>
-              <a:ext uri="{FF2B5EF4-FFF2-40B4-BE49-F238E27FC236}">
-                <a16:creationId xmlns:a16="http://schemas.microsoft.com/office/drawing/2014/main" id="{8B0786F5-B11C-461C-A1F8-DFD8E2DA0775}"/>
-              </a:ext>
-            </a:extLst>
-          </p:cNvPr>
-          <p:cNvSpPr/>
-          <p:nvPr/>
-        </p:nvSpPr>
-        <p:spPr>
-          <a:xfrm>
-            <a:off x="1758545" y="23621390"/>
-            <a:ext cx="6351271" cy="584775"/>
-          </a:xfrm>
-          <a:prstGeom prst="rect">
-            <a:avLst/>
-          </a:prstGeom>
-          <a:solidFill>
-            <a:srgbClr val="FFFF19"/>
-          </a:solidFill>
-          <a:ln cap="rnd">
-            <a:noFill/>
-          </a:ln>
-          <a:effectLst>
-            <a:softEdge rad="0"/>
-          </a:effectLst>
-        </p:spPr>
-        <p:txBody>
-          <a:bodyPr wrap="square">
-            <a:spAutoFit/>
-          </a:bodyPr>
-          <a:lstStyle/>
-          <a:p>
-            <a:pPr algn="ctr">
-              <a:spcAft>
-                <a:spcPts val="0"/>
-              </a:spcAft>
-            </a:pPr>
-            <a:r>
-              <a:rPr lang="en-CA" sz="3200" kern="1400" dirty="0">
-                <a:solidFill>
-                  <a:srgbClr val="000000"/>
-                </a:solidFill>
-                <a:latin typeface="Arial" panose="020B0604020202020204" pitchFamily="34" charset="0"/>
-                <a:ea typeface="Times New Roman" panose="02020603050405020304" pitchFamily="18" charset="0"/>
-                <a:cs typeface="Arial" panose="020B0604020202020204" pitchFamily="34" charset="0"/>
-              </a:rPr>
-              <a:t>Studies classified (n = 564)</a:t>
-            </a:r>
-            <a:endParaRPr lang="en-GB" sz="3200" kern="1400" dirty="0">
-              <a:solidFill>
-                <a:srgbClr val="000000"/>
-              </a:solidFill>
-              <a:effectLst/>
-              <a:latin typeface="Arial" panose="020B0604020202020204" pitchFamily="34" charset="0"/>
-              <a:ea typeface="Times New Roman" panose="02020603050405020304" pitchFamily="18" charset="0"/>
-              <a:cs typeface="Arial" panose="020B0604020202020204" pitchFamily="34" charset="0"/>
-            </a:endParaRPr>
-          </a:p>
-        </p:txBody>
-      </p:sp>
-      <p:sp>
-        <p:nvSpPr>
-          <p:cNvPr id="83" name="Rectangle 82">
-            <a:extLst>
-              <a:ext uri="{FF2B5EF4-FFF2-40B4-BE49-F238E27FC236}">
-                <a16:creationId xmlns:a16="http://schemas.microsoft.com/office/drawing/2014/main" id="{D368B637-F20F-44B6-8DDF-AACAF4CA4CFE}"/>
-              </a:ext>
-            </a:extLst>
-          </p:cNvPr>
-          <p:cNvSpPr/>
-          <p:nvPr/>
-        </p:nvSpPr>
-        <p:spPr>
-          <a:xfrm>
-            <a:off x="8675816" y="21731843"/>
-            <a:ext cx="5154753" cy="3323987"/>
-          </a:xfrm>
-          <a:prstGeom prst="rect">
-            <a:avLst/>
-          </a:prstGeom>
-          <a:solidFill>
-            <a:srgbClr val="FFFF19"/>
-          </a:solidFill>
-          <a:ln cap="rnd">
-            <a:noFill/>
-          </a:ln>
-          <a:effectLst>
-            <a:softEdge rad="0"/>
-          </a:effectLst>
-        </p:spPr>
-        <p:txBody>
-          <a:bodyPr wrap="square">
-            <a:spAutoFit/>
-          </a:bodyPr>
-          <a:lstStyle/>
-          <a:p>
-            <a:pPr algn="ctr">
-              <a:spcAft>
-                <a:spcPts val="0"/>
-              </a:spcAft>
-            </a:pPr>
-            <a:r>
-              <a:rPr lang="en-CA" sz="3200" kern="1400" dirty="0">
-                <a:solidFill>
-                  <a:srgbClr val="000000"/>
-                </a:solidFill>
-                <a:latin typeface="Arial" panose="020B0604020202020204" pitchFamily="34" charset="0"/>
-                <a:ea typeface="Times New Roman" panose="02020603050405020304" pitchFamily="18" charset="0"/>
-                <a:cs typeface="Arial" panose="020B0604020202020204" pitchFamily="34" charset="0"/>
-              </a:rPr>
-              <a:t>Full-text articles excluded</a:t>
-            </a:r>
-            <a:br>
-              <a:rPr lang="en-CA" sz="3200" kern="1400" dirty="0">
-                <a:solidFill>
-                  <a:srgbClr val="000000"/>
-                </a:solidFill>
-                <a:latin typeface="Arial" panose="020B0604020202020204" pitchFamily="34" charset="0"/>
-                <a:ea typeface="Times New Roman" panose="02020603050405020304" pitchFamily="18" charset="0"/>
-                <a:cs typeface="Arial" panose="020B0604020202020204" pitchFamily="34" charset="0"/>
-              </a:rPr>
-            </a:br>
-            <a:r>
-              <a:rPr lang="en-CA" sz="3200" kern="1400" dirty="0">
-                <a:solidFill>
-                  <a:srgbClr val="000000"/>
-                </a:solidFill>
-                <a:latin typeface="Arial" panose="020B0604020202020204" pitchFamily="34" charset="0"/>
-                <a:ea typeface="Times New Roman" panose="02020603050405020304" pitchFamily="18" charset="0"/>
-                <a:cs typeface="Arial" panose="020B0604020202020204" pitchFamily="34" charset="0"/>
-              </a:rPr>
-              <a:t>(n = 190)</a:t>
-            </a:r>
-          </a:p>
-          <a:p>
-            <a:pPr algn="ctr">
-              <a:spcAft>
-                <a:spcPts val="0"/>
-              </a:spcAft>
-            </a:pPr>
-            <a:endParaRPr lang="en-GB" sz="600" kern="1400" dirty="0">
-              <a:solidFill>
-                <a:srgbClr val="000000"/>
-              </a:solidFill>
-              <a:latin typeface="Arial" panose="020B0604020202020204" pitchFamily="34" charset="0"/>
-              <a:ea typeface="Times New Roman" panose="02020603050405020304" pitchFamily="18" charset="0"/>
-              <a:cs typeface="Arial" panose="020B0604020202020204" pitchFamily="34" charset="0"/>
-            </a:endParaRPr>
-          </a:p>
-          <a:p>
-            <a:pPr>
-              <a:spcAft>
-                <a:spcPts val="0"/>
-              </a:spcAft>
-            </a:pPr>
-            <a:r>
-              <a:rPr lang="en-GB" sz="2800" kern="1400" dirty="0">
-                <a:solidFill>
-                  <a:srgbClr val="000000"/>
-                </a:solidFill>
-                <a:latin typeface="Arial" panose="020B0604020202020204" pitchFamily="34" charset="0"/>
-                <a:ea typeface="Times New Roman" panose="02020603050405020304" pitchFamily="18" charset="0"/>
-                <a:cs typeface="Arial" panose="020B0604020202020204" pitchFamily="34" charset="0"/>
-              </a:rPr>
-              <a:t>Not UK Biobank	n = 66   </a:t>
-            </a:r>
-          </a:p>
-          <a:p>
-            <a:pPr>
-              <a:spcAft>
-                <a:spcPts val="0"/>
-              </a:spcAft>
-            </a:pPr>
-            <a:r>
-              <a:rPr lang="en-GB" sz="2800" kern="1400" dirty="0">
-                <a:solidFill>
-                  <a:srgbClr val="000000"/>
-                </a:solidFill>
-                <a:latin typeface="Arial" panose="020B0604020202020204" pitchFamily="34" charset="0"/>
-                <a:ea typeface="Times New Roman" panose="02020603050405020304" pitchFamily="18" charset="0"/>
-                <a:cs typeface="Arial" panose="020B0604020202020204" pitchFamily="34" charset="0"/>
-              </a:rPr>
-              <a:t>Review 	n = 48</a:t>
-            </a:r>
-          </a:p>
-          <a:p>
-            <a:pPr>
-              <a:spcAft>
-                <a:spcPts val="0"/>
-              </a:spcAft>
-            </a:pPr>
-            <a:r>
-              <a:rPr lang="en-GB" sz="2800" kern="1400" dirty="0">
-                <a:solidFill>
-                  <a:srgbClr val="000000"/>
-                </a:solidFill>
-                <a:latin typeface="Arial" panose="020B0604020202020204" pitchFamily="34" charset="0"/>
-                <a:ea typeface="Times New Roman" panose="02020603050405020304" pitchFamily="18" charset="0"/>
-                <a:cs typeface="Arial" panose="020B0604020202020204" pitchFamily="34" charset="0"/>
-              </a:rPr>
-              <a:t>Summary data	n = 29</a:t>
-            </a:r>
-          </a:p>
-          <a:p>
-            <a:pPr>
-              <a:spcAft>
-                <a:spcPts val="0"/>
-              </a:spcAft>
-            </a:pPr>
-            <a:r>
-              <a:rPr lang="en-GB" sz="2800" kern="1400" dirty="0">
-                <a:solidFill>
-                  <a:srgbClr val="000000"/>
-                </a:solidFill>
-                <a:latin typeface="Arial" panose="020B0604020202020204" pitchFamily="34" charset="0"/>
-                <a:ea typeface="Times New Roman" panose="02020603050405020304" pitchFamily="18" charset="0"/>
-                <a:cs typeface="Arial" panose="020B0604020202020204" pitchFamily="34" charset="0"/>
-              </a:rPr>
-              <a:t>Pooled cohorts	n = 24</a:t>
-            </a:r>
-          </a:p>
-          <a:p>
-            <a:pPr>
-              <a:spcAft>
-                <a:spcPts val="0"/>
-              </a:spcAft>
-            </a:pPr>
-            <a:r>
-              <a:rPr lang="en-GB" sz="2800" kern="1400" dirty="0">
-                <a:solidFill>
-                  <a:srgbClr val="000000"/>
-                </a:solidFill>
-                <a:latin typeface="Arial" panose="020B0604020202020204" pitchFamily="34" charset="0"/>
-                <a:ea typeface="Times New Roman" panose="02020603050405020304" pitchFamily="18" charset="0"/>
-                <a:cs typeface="Arial" panose="020B0604020202020204" pitchFamily="34" charset="0"/>
-              </a:rPr>
-              <a:t>Other 	n = 23</a:t>
-            </a:r>
-            <a:endParaRPr lang="en-CA" sz="2800" kern="1400" dirty="0">
-              <a:solidFill>
-                <a:srgbClr val="000000"/>
-              </a:solidFill>
-              <a:latin typeface="Arial" panose="020B0604020202020204" pitchFamily="34" charset="0"/>
-              <a:ea typeface="Times New Roman" panose="02020603050405020304" pitchFamily="18" charset="0"/>
-              <a:cs typeface="Arial" panose="020B0604020202020204" pitchFamily="34" charset="0"/>
-            </a:endParaRPr>
-          </a:p>
-        </p:txBody>
-      </p:sp>
-      <p:sp>
-        <p:nvSpPr>
-          <p:cNvPr id="84" name="Rectangle 83">
-            <a:extLst>
-              <a:ext uri="{FF2B5EF4-FFF2-40B4-BE49-F238E27FC236}">
-                <a16:creationId xmlns:a16="http://schemas.microsoft.com/office/drawing/2014/main" id="{3E7849FE-51A3-4EF1-90A9-F68B619B69EA}"/>
-              </a:ext>
-            </a:extLst>
-          </p:cNvPr>
-          <p:cNvSpPr/>
-          <p:nvPr/>
-        </p:nvSpPr>
-        <p:spPr>
-          <a:xfrm>
-            <a:off x="1907818" y="24852589"/>
-            <a:ext cx="6351265" cy="1077218"/>
-          </a:xfrm>
-          <a:prstGeom prst="rect">
-            <a:avLst/>
-          </a:prstGeom>
-          <a:solidFill>
-            <a:srgbClr val="FFFF19"/>
-          </a:solidFill>
-          <a:ln cap="rnd">
-            <a:noFill/>
-          </a:ln>
-          <a:effectLst>
-            <a:softEdge rad="0"/>
-          </a:effectLst>
-        </p:spPr>
-        <p:txBody>
-          <a:bodyPr wrap="square">
-            <a:spAutoFit/>
-          </a:bodyPr>
-          <a:lstStyle/>
-          <a:p>
-            <a:pPr algn="ctr">
-              <a:spcAft>
-                <a:spcPts val="0"/>
-              </a:spcAft>
-            </a:pPr>
-            <a:r>
-              <a:rPr lang="en-CA" sz="3200" kern="1400" dirty="0">
-                <a:solidFill>
-                  <a:srgbClr val="000000"/>
-                </a:solidFill>
-                <a:latin typeface="Arial" panose="020B0604020202020204" pitchFamily="34" charset="0"/>
-                <a:ea typeface="Times New Roman" panose="02020603050405020304" pitchFamily="18" charset="0"/>
-                <a:cs typeface="Arial" panose="020B0604020202020204" pitchFamily="34" charset="0"/>
-              </a:rPr>
-              <a:t>Observational epidemiology studies (n =  178)</a:t>
-            </a:r>
-            <a:endParaRPr lang="en-GB" sz="3200" kern="1400" dirty="0">
-              <a:solidFill>
-                <a:srgbClr val="000000"/>
-              </a:solidFill>
-              <a:effectLst/>
-              <a:latin typeface="Arial" panose="020B0604020202020204" pitchFamily="34" charset="0"/>
-              <a:ea typeface="Times New Roman" panose="02020603050405020304" pitchFamily="18" charset="0"/>
-              <a:cs typeface="Arial" panose="020B0604020202020204" pitchFamily="34" charset="0"/>
-            </a:endParaRPr>
-          </a:p>
-        </p:txBody>
-      </p:sp>
-      <p:cxnSp>
-        <p:nvCxnSpPr>
-          <p:cNvPr id="90" name="AutoShape 2">
-            <a:extLst>
-              <a:ext uri="{FF2B5EF4-FFF2-40B4-BE49-F238E27FC236}">
-                <a16:creationId xmlns:a16="http://schemas.microsoft.com/office/drawing/2014/main" id="{DBA1018E-E522-4EF3-8164-B31BC1FB199A}"/>
-              </a:ext>
-            </a:extLst>
-          </p:cNvPr>
-          <p:cNvCxnSpPr>
-            <a:cxnSpLocks noChangeShapeType="1"/>
-          </p:cNvCxnSpPr>
-          <p:nvPr/>
-        </p:nvCxnSpPr>
-        <p:spPr bwMode="auto">
-          <a:xfrm flipH="1">
-            <a:off x="5092593" y="21258555"/>
-            <a:ext cx="6" cy="350991"/>
-          </a:xfrm>
-          <a:prstGeom prst="straightConnector1">
             <a:avLst/>
           </a:prstGeom>
           <a:gradFill flip="none" rotWithShape="1">
@@ -16429,58 +15691,94 @@
                 </a:srgbClr>
               </a:gs>
             </a:gsLst>
-            <a:path path="circle">
-              <a:fillToRect t="100000" r="100000"/>
-            </a:path>
-            <a:tileRect l="-100000" b="-100000"/>
+            <a:lin ang="5400000" scaled="1"/>
+            <a:tileRect/>
           </a:gradFill>
-          <a:ln w="57150">
-            <a:solidFill>
-              <a:srgbClr val="000000"/>
-            </a:solidFill>
-            <a:round/>
-            <a:headEnd/>
-            <a:tailEnd type="triangle" w="med" len="med"/>
-          </a:ln>
-          <a:effectLst/>
-          <a:extLst>
-            <a:ext uri="{909E8E84-426E-40DD-AFC4-6F175D3DCCD1}">
-              <a14:hiddenFill xmlns:a14="http://schemas.microsoft.com/office/drawing/2010/main">
-                <a:noFill/>
-              </a14:hiddenFill>
-            </a:ext>
-            <a:ext uri="{AF507438-7753-43E0-B8FC-AC1667EBCBE1}">
-              <a14:hiddenEffects xmlns:a14="http://schemas.microsoft.com/office/drawing/2010/main">
-                <a:effectLst>
-                  <a:outerShdw dist="35921" dir="2700000" algn="ctr" rotWithShape="0">
-                    <a:srgbClr val="CCCCCC"/>
-                  </a:outerShdw>
-                </a:effectLst>
-              </a14:hiddenEffects>
-            </a:ext>
-          </a:extLst>
+          <a:ln/>
         </p:spPr>
-      </p:cxnSp>
-      <p:cxnSp>
-        <p:nvCxnSpPr>
-          <p:cNvPr id="91" name="AutoShape 2">
+        <p:style>
+          <a:lnRef idx="1">
+            <a:schemeClr val="accent1"/>
+          </a:lnRef>
+          <a:fillRef idx="2">
+            <a:schemeClr val="accent1"/>
+          </a:fillRef>
+          <a:effectRef idx="1">
+            <a:schemeClr val="accent1"/>
+          </a:effectRef>
+          <a:fontRef idx="minor">
+            <a:schemeClr val="dk1"/>
+          </a:fontRef>
+        </p:style>
+        <p:txBody>
+          <a:bodyPr wrap="square">
+            <a:spAutoFit/>
+          </a:bodyPr>
+          <a:lstStyle/>
+          <a:p>
+            <a:pPr algn="ctr">
+              <a:spcAft>
+                <a:spcPts val="0"/>
+              </a:spcAft>
+            </a:pPr>
+            <a:r>
+              <a:rPr lang="en-CA" sz="3200" kern="1400" dirty="0">
+                <a:solidFill>
+                  <a:srgbClr val="000000"/>
+                </a:solidFill>
+                <a:latin typeface="Arial" panose="020B0604020202020204" pitchFamily="34" charset="0"/>
+                <a:ea typeface="Times New Roman" panose="02020603050405020304" pitchFamily="18" charset="0"/>
+                <a:cs typeface="Arial" panose="020B0604020202020204" pitchFamily="34" charset="0"/>
+              </a:rPr>
+              <a:t>Records excluded </a:t>
+            </a:r>
+          </a:p>
+          <a:p>
+            <a:pPr algn="ctr">
+              <a:spcAft>
+                <a:spcPts val="0"/>
+              </a:spcAft>
+            </a:pPr>
+            <a:r>
+              <a:rPr lang="en-CA" sz="3200" kern="1400" dirty="0">
+                <a:solidFill>
+                  <a:srgbClr val="000000"/>
+                </a:solidFill>
+                <a:latin typeface="Arial" panose="020B0604020202020204" pitchFamily="34" charset="0"/>
+                <a:ea typeface="Times New Roman" panose="02020603050405020304" pitchFamily="18" charset="0"/>
+                <a:cs typeface="Arial" panose="020B0604020202020204" pitchFamily="34" charset="0"/>
+              </a:rPr>
+              <a:t>(n = 475)</a:t>
+            </a:r>
+            <a:endParaRPr lang="en-GB" sz="3200" kern="1400" dirty="0">
+              <a:solidFill>
+                <a:srgbClr val="000000"/>
+              </a:solidFill>
+              <a:latin typeface="Arial" panose="020B0604020202020204" pitchFamily="34" charset="0"/>
+              <a:ea typeface="Times New Roman" panose="02020603050405020304" pitchFamily="18" charset="0"/>
+              <a:cs typeface="Arial" panose="020B0604020202020204" pitchFamily="34" charset="0"/>
+            </a:endParaRPr>
+          </a:p>
+        </p:txBody>
+      </p:sp>
+      <p:sp>
+        <p:nvSpPr>
+          <p:cNvPr id="81" name="Rectangle 80">
             <a:extLst>
               <a:ext uri="{FF2B5EF4-FFF2-40B4-BE49-F238E27FC236}">
-                <a16:creationId xmlns:a16="http://schemas.microsoft.com/office/drawing/2014/main" id="{31126994-F6BE-49ED-9C12-F3AC2A3D8833}"/>
+                <a16:creationId xmlns:a16="http://schemas.microsoft.com/office/drawing/2014/main" id="{B6D224EC-48B2-4F21-9BB7-4B47D2F7BE45}"/>
               </a:ext>
             </a:extLst>
           </p:cNvPr>
-          <p:cNvCxnSpPr>
-            <a:cxnSpLocks noChangeShapeType="1"/>
-          </p:cNvCxnSpPr>
+          <p:cNvSpPr/>
           <p:nvPr/>
-        </p:nvCxnSpPr>
-        <p:spPr bwMode="auto">
-          <a:xfrm flipH="1">
-            <a:off x="5024595" y="23159681"/>
-            <a:ext cx="6" cy="350991"/>
+        </p:nvSpPr>
+        <p:spPr>
+          <a:xfrm>
+            <a:off x="2245338" y="20346483"/>
+            <a:ext cx="6060255" cy="1077218"/>
           </a:xfrm>
-          <a:prstGeom prst="straightConnector1">
+          <a:prstGeom prst="rect">
             <a:avLst/>
           </a:prstGeom>
           <a:gradFill flip="none" rotWithShape="1">
@@ -16504,58 +15802,77 @@
                 </a:srgbClr>
               </a:gs>
             </a:gsLst>
-            <a:path path="circle">
-              <a:fillToRect t="100000" r="100000"/>
-            </a:path>
-            <a:tileRect l="-100000" b="-100000"/>
+            <a:lin ang="5400000" scaled="1"/>
+            <a:tileRect/>
           </a:gradFill>
-          <a:ln w="57150">
-            <a:solidFill>
-              <a:srgbClr val="000000"/>
-            </a:solidFill>
-            <a:round/>
-            <a:headEnd/>
-            <a:tailEnd type="triangle" w="med" len="med"/>
-          </a:ln>
-          <a:effectLst/>
-          <a:extLst>
-            <a:ext uri="{909E8E84-426E-40DD-AFC4-6F175D3DCCD1}">
-              <a14:hiddenFill xmlns:a14="http://schemas.microsoft.com/office/drawing/2010/main">
-                <a:noFill/>
-              </a14:hiddenFill>
-            </a:ext>
-            <a:ext uri="{AF507438-7753-43E0-B8FC-AC1667EBCBE1}">
-              <a14:hiddenEffects xmlns:a14="http://schemas.microsoft.com/office/drawing/2010/main">
-                <a:effectLst>
-                  <a:outerShdw dist="35921" dir="2700000" algn="ctr" rotWithShape="0">
-                    <a:srgbClr val="CCCCCC"/>
-                  </a:outerShdw>
-                </a:effectLst>
-              </a14:hiddenEffects>
-            </a:ext>
-          </a:extLst>
+          <a:ln/>
         </p:spPr>
-      </p:cxnSp>
-      <p:cxnSp>
-        <p:nvCxnSpPr>
-          <p:cNvPr id="92" name="AutoShape 2">
+        <p:style>
+          <a:lnRef idx="1">
+            <a:schemeClr val="accent1"/>
+          </a:lnRef>
+          <a:fillRef idx="2">
+            <a:schemeClr val="accent1"/>
+          </a:fillRef>
+          <a:effectRef idx="1">
+            <a:schemeClr val="accent1"/>
+          </a:effectRef>
+          <a:fontRef idx="minor">
+            <a:schemeClr val="dk1"/>
+          </a:fontRef>
+        </p:style>
+        <p:txBody>
+          <a:bodyPr wrap="square">
+            <a:spAutoFit/>
+          </a:bodyPr>
+          <a:lstStyle/>
+          <a:p>
+            <a:pPr algn="ctr">
+              <a:spcAft>
+                <a:spcPts val="0"/>
+              </a:spcAft>
+            </a:pPr>
+            <a:r>
+              <a:rPr lang="en-CA" sz="3200" kern="1400" dirty="0">
+                <a:solidFill>
+                  <a:srgbClr val="000000"/>
+                </a:solidFill>
+                <a:latin typeface="Arial" panose="020B0604020202020204" pitchFamily="34" charset="0"/>
+                <a:ea typeface="Times New Roman" panose="02020603050405020304" pitchFamily="18" charset="0"/>
+                <a:cs typeface="Arial" panose="020B0604020202020204" pitchFamily="34" charset="0"/>
+              </a:rPr>
+              <a:t>Full-text articles assessed for eligibility (n =  758)</a:t>
+            </a:r>
+            <a:endParaRPr lang="en-GB" sz="3200" kern="1400" dirty="0">
+              <a:solidFill>
+                <a:srgbClr val="000000"/>
+              </a:solidFill>
+              <a:effectLst/>
+              <a:latin typeface="Arial" panose="020B0604020202020204" pitchFamily="34" charset="0"/>
+              <a:ea typeface="Times New Roman" panose="02020603050405020304" pitchFamily="18" charset="0"/>
+              <a:cs typeface="Arial" panose="020B0604020202020204" pitchFamily="34" charset="0"/>
+            </a:endParaRPr>
+          </a:p>
+        </p:txBody>
+      </p:sp>
+      <p:sp>
+        <p:nvSpPr>
+          <p:cNvPr id="82" name="Rectangle 81">
             <a:extLst>
               <a:ext uri="{FF2B5EF4-FFF2-40B4-BE49-F238E27FC236}">
-                <a16:creationId xmlns:a16="http://schemas.microsoft.com/office/drawing/2014/main" id="{450D6D5A-B93D-4E36-8EF0-EF87D5622338}"/>
+                <a16:creationId xmlns:a16="http://schemas.microsoft.com/office/drawing/2014/main" id="{8B0786F5-B11C-461C-A1F8-DFD8E2DA0775}"/>
               </a:ext>
             </a:extLst>
           </p:cNvPr>
-          <p:cNvCxnSpPr>
-            <a:cxnSpLocks noChangeShapeType="1"/>
-          </p:cNvCxnSpPr>
+          <p:cNvSpPr/>
           <p:nvPr/>
-        </p:nvCxnSpPr>
-        <p:spPr bwMode="auto">
-          <a:xfrm flipH="1">
-            <a:off x="5029501" y="24340805"/>
-            <a:ext cx="6" cy="350991"/>
+        </p:nvSpPr>
+        <p:spPr>
+          <a:xfrm>
+            <a:off x="2245266" y="21822292"/>
+            <a:ext cx="6060255" cy="584775"/>
           </a:xfrm>
-          <a:prstGeom prst="straightConnector1">
+          <a:prstGeom prst="rect">
             <a:avLst/>
           </a:prstGeom>
           <a:gradFill flip="none" rotWithShape="1">
@@ -16579,58 +15896,77 @@
                 </a:srgbClr>
               </a:gs>
             </a:gsLst>
-            <a:path path="circle">
-              <a:fillToRect t="100000" r="100000"/>
-            </a:path>
-            <a:tileRect l="-100000" b="-100000"/>
+            <a:lin ang="5400000" scaled="1"/>
+            <a:tileRect/>
           </a:gradFill>
-          <a:ln w="57150">
-            <a:solidFill>
-              <a:srgbClr val="000000"/>
-            </a:solidFill>
-            <a:round/>
-            <a:headEnd/>
-            <a:tailEnd type="triangle" w="med" len="med"/>
-          </a:ln>
-          <a:effectLst/>
-          <a:extLst>
-            <a:ext uri="{909E8E84-426E-40DD-AFC4-6F175D3DCCD1}">
-              <a14:hiddenFill xmlns:a14="http://schemas.microsoft.com/office/drawing/2010/main">
-                <a:noFill/>
-              </a14:hiddenFill>
-            </a:ext>
-            <a:ext uri="{AF507438-7753-43E0-B8FC-AC1667EBCBE1}">
-              <a14:hiddenEffects xmlns:a14="http://schemas.microsoft.com/office/drawing/2010/main">
-                <a:effectLst>
-                  <a:outerShdw dist="35921" dir="2700000" algn="ctr" rotWithShape="0">
-                    <a:srgbClr val="CCCCCC"/>
-                  </a:outerShdw>
-                </a:effectLst>
-              </a14:hiddenEffects>
-            </a:ext>
-          </a:extLst>
+          <a:ln/>
         </p:spPr>
-      </p:cxnSp>
-      <p:cxnSp>
-        <p:nvCxnSpPr>
-          <p:cNvPr id="93" name="AutoShape 5">
+        <p:style>
+          <a:lnRef idx="1">
+            <a:schemeClr val="accent1"/>
+          </a:lnRef>
+          <a:fillRef idx="2">
+            <a:schemeClr val="accent1"/>
+          </a:fillRef>
+          <a:effectRef idx="1">
+            <a:schemeClr val="accent1"/>
+          </a:effectRef>
+          <a:fontRef idx="minor">
+            <a:schemeClr val="dk1"/>
+          </a:fontRef>
+        </p:style>
+        <p:txBody>
+          <a:bodyPr wrap="square">
+            <a:spAutoFit/>
+          </a:bodyPr>
+          <a:lstStyle/>
+          <a:p>
+            <a:pPr algn="ctr">
+              <a:spcAft>
+                <a:spcPts val="0"/>
+              </a:spcAft>
+            </a:pPr>
+            <a:r>
+              <a:rPr lang="en-CA" sz="3200" kern="1400" dirty="0">
+                <a:solidFill>
+                  <a:srgbClr val="000000"/>
+                </a:solidFill>
+                <a:latin typeface="Arial" panose="020B0604020202020204" pitchFamily="34" charset="0"/>
+                <a:ea typeface="Times New Roman" panose="02020603050405020304" pitchFamily="18" charset="0"/>
+                <a:cs typeface="Arial" panose="020B0604020202020204" pitchFamily="34" charset="0"/>
+              </a:rPr>
+              <a:t>Studies classified (n = 564)</a:t>
+            </a:r>
+            <a:endParaRPr lang="en-GB" sz="3200" kern="1400" dirty="0">
+              <a:solidFill>
+                <a:srgbClr val="000000"/>
+              </a:solidFill>
+              <a:effectLst/>
+              <a:latin typeface="Arial" panose="020B0604020202020204" pitchFamily="34" charset="0"/>
+              <a:ea typeface="Times New Roman" panose="02020603050405020304" pitchFamily="18" charset="0"/>
+              <a:cs typeface="Arial" panose="020B0604020202020204" pitchFamily="34" charset="0"/>
+            </a:endParaRPr>
+          </a:p>
+        </p:txBody>
+      </p:sp>
+      <p:sp>
+        <p:nvSpPr>
+          <p:cNvPr id="83" name="Rectangle 82">
             <a:extLst>
               <a:ext uri="{FF2B5EF4-FFF2-40B4-BE49-F238E27FC236}">
-                <a16:creationId xmlns:a16="http://schemas.microsoft.com/office/drawing/2014/main" id="{6A0D5020-EA19-4E30-A3F1-AC4D164BF1B4}"/>
+                <a16:creationId xmlns:a16="http://schemas.microsoft.com/office/drawing/2014/main" id="{D368B637-F20F-44B6-8DDF-AACAF4CA4CFE}"/>
               </a:ext>
             </a:extLst>
           </p:cNvPr>
-          <p:cNvCxnSpPr>
-            <a:cxnSpLocks noChangeShapeType="1"/>
-          </p:cNvCxnSpPr>
+          <p:cNvSpPr/>
           <p:nvPr/>
-        </p:nvCxnSpPr>
-        <p:spPr bwMode="auto">
+        </p:nvSpPr>
+        <p:spPr>
           <a:xfrm>
-            <a:off x="5441662" y="23180248"/>
-            <a:ext cx="3094628" cy="0"/>
+            <a:off x="8972432" y="20160298"/>
+            <a:ext cx="5154753" cy="3323987"/>
           </a:xfrm>
-          <a:prstGeom prst="straightConnector1">
+          <a:prstGeom prst="rect">
             <a:avLst/>
           </a:prstGeom>
           <a:gradFill flip="none" rotWithShape="1">
@@ -16654,51 +15990,202 @@
                 </a:srgbClr>
               </a:gs>
             </a:gsLst>
-            <a:path path="circle">
-              <a:fillToRect t="100000" r="100000"/>
-            </a:path>
-            <a:tileRect l="-100000" b="-100000"/>
+            <a:lin ang="5400000" scaled="1"/>
+            <a:tileRect/>
           </a:gradFill>
-          <a:ln w="38100">
-            <a:headEnd/>
-            <a:tailEnd type="triangle" w="med" len="med"/>
-          </a:ln>
+          <a:ln/>
         </p:spPr>
         <p:style>
           <a:lnRef idx="1">
-            <a:schemeClr val="dk1"/>
+            <a:schemeClr val="accent1"/>
           </a:lnRef>
-          <a:fillRef idx="0">
-            <a:schemeClr val="dk1"/>
+          <a:fillRef idx="2">
+            <a:schemeClr val="accent1"/>
           </a:fillRef>
-          <a:effectRef idx="0">
-            <a:schemeClr val="dk1"/>
+          <a:effectRef idx="1">
+            <a:schemeClr val="accent1"/>
           </a:effectRef>
           <a:fontRef idx="minor">
-            <a:schemeClr val="tx1"/>
+            <a:schemeClr val="dk1"/>
           </a:fontRef>
         </p:style>
-      </p:cxnSp>
-      <p:cxnSp>
-        <p:nvCxnSpPr>
-          <p:cNvPr id="94" name="AutoShape 5">
+        <p:txBody>
+          <a:bodyPr wrap="square">
+            <a:spAutoFit/>
+          </a:bodyPr>
+          <a:lstStyle/>
+          <a:p>
+            <a:pPr algn="ctr">
+              <a:spcAft>
+                <a:spcPts val="0"/>
+              </a:spcAft>
+            </a:pPr>
+            <a:r>
+              <a:rPr lang="en-CA" sz="3200" kern="1400" dirty="0">
+                <a:solidFill>
+                  <a:srgbClr val="000000"/>
+                </a:solidFill>
+                <a:latin typeface="Arial" panose="020B0604020202020204" pitchFamily="34" charset="0"/>
+                <a:ea typeface="Times New Roman" panose="02020603050405020304" pitchFamily="18" charset="0"/>
+                <a:cs typeface="Arial" panose="020B0604020202020204" pitchFamily="34" charset="0"/>
+              </a:rPr>
+              <a:t>Full-text articles excluded</a:t>
+            </a:r>
+            <a:br>
+              <a:rPr lang="en-CA" sz="3200" kern="1400" dirty="0">
+                <a:solidFill>
+                  <a:srgbClr val="000000"/>
+                </a:solidFill>
+                <a:latin typeface="Arial" panose="020B0604020202020204" pitchFamily="34" charset="0"/>
+                <a:ea typeface="Times New Roman" panose="02020603050405020304" pitchFamily="18" charset="0"/>
+                <a:cs typeface="Arial" panose="020B0604020202020204" pitchFamily="34" charset="0"/>
+              </a:rPr>
+            </a:br>
+            <a:r>
+              <a:rPr lang="en-CA" sz="3200" kern="1400" dirty="0">
+                <a:solidFill>
+                  <a:srgbClr val="000000"/>
+                </a:solidFill>
+                <a:latin typeface="Arial" panose="020B0604020202020204" pitchFamily="34" charset="0"/>
+                <a:ea typeface="Times New Roman" panose="02020603050405020304" pitchFamily="18" charset="0"/>
+                <a:cs typeface="Arial" panose="020B0604020202020204" pitchFamily="34" charset="0"/>
+              </a:rPr>
+              <a:t>(n = 190)</a:t>
+            </a:r>
+          </a:p>
+          <a:p>
+            <a:pPr algn="ctr">
+              <a:spcAft>
+                <a:spcPts val="0"/>
+              </a:spcAft>
+            </a:pPr>
+            <a:endParaRPr lang="en-GB" sz="600" kern="1400" dirty="0">
+              <a:solidFill>
+                <a:srgbClr val="000000"/>
+              </a:solidFill>
+              <a:latin typeface="Arial" panose="020B0604020202020204" pitchFamily="34" charset="0"/>
+              <a:ea typeface="Times New Roman" panose="02020603050405020304" pitchFamily="18" charset="0"/>
+              <a:cs typeface="Arial" panose="020B0604020202020204" pitchFamily="34" charset="0"/>
+            </a:endParaRPr>
+          </a:p>
+          <a:p>
+            <a:pPr>
+              <a:spcAft>
+                <a:spcPts val="0"/>
+              </a:spcAft>
+            </a:pPr>
+            <a:r>
+              <a:rPr lang="en-GB" sz="2800" kern="1400" dirty="0">
+                <a:solidFill>
+                  <a:srgbClr val="000000"/>
+                </a:solidFill>
+                <a:latin typeface="Arial" panose="020B0604020202020204" pitchFamily="34" charset="0"/>
+                <a:ea typeface="Times New Roman" panose="02020603050405020304" pitchFamily="18" charset="0"/>
+                <a:cs typeface="Arial" panose="020B0604020202020204" pitchFamily="34" charset="0"/>
+              </a:rPr>
+              <a:t>Not UK Biobank	n = 66   </a:t>
+            </a:r>
+          </a:p>
+          <a:p>
+            <a:pPr>
+              <a:spcAft>
+                <a:spcPts val="0"/>
+              </a:spcAft>
+            </a:pPr>
+            <a:r>
+              <a:rPr lang="en-GB" sz="2800" kern="1400" dirty="0">
+                <a:solidFill>
+                  <a:srgbClr val="000000"/>
+                </a:solidFill>
+                <a:latin typeface="Arial" panose="020B0604020202020204" pitchFamily="34" charset="0"/>
+                <a:ea typeface="Times New Roman" panose="02020603050405020304" pitchFamily="18" charset="0"/>
+                <a:cs typeface="Arial" panose="020B0604020202020204" pitchFamily="34" charset="0"/>
+              </a:rPr>
+              <a:t>Review 	n = 48</a:t>
+            </a:r>
+          </a:p>
+          <a:p>
+            <a:pPr>
+              <a:spcAft>
+                <a:spcPts val="0"/>
+              </a:spcAft>
+            </a:pPr>
+            <a:r>
+              <a:rPr lang="en-GB" sz="2800" kern="1400" dirty="0">
+                <a:solidFill>
+                  <a:srgbClr val="000000"/>
+                </a:solidFill>
+                <a:latin typeface="Arial" panose="020B0604020202020204" pitchFamily="34" charset="0"/>
+                <a:ea typeface="Times New Roman" panose="02020603050405020304" pitchFamily="18" charset="0"/>
+                <a:cs typeface="Arial" panose="020B0604020202020204" pitchFamily="34" charset="0"/>
+              </a:rPr>
+              <a:t>Summary data	n = 29</a:t>
+            </a:r>
+          </a:p>
+          <a:p>
+            <a:pPr>
+              <a:spcAft>
+                <a:spcPts val="0"/>
+              </a:spcAft>
+            </a:pPr>
+            <a:r>
+              <a:rPr lang="en-GB" sz="2800" kern="1400" dirty="0">
+                <a:solidFill>
+                  <a:srgbClr val="000000"/>
+                </a:solidFill>
+                <a:latin typeface="Arial" panose="020B0604020202020204" pitchFamily="34" charset="0"/>
+                <a:ea typeface="Times New Roman" panose="02020603050405020304" pitchFamily="18" charset="0"/>
+                <a:cs typeface="Arial" panose="020B0604020202020204" pitchFamily="34" charset="0"/>
+              </a:rPr>
+              <a:t>Pooled cohorts	n = 24</a:t>
+            </a:r>
+          </a:p>
+          <a:p>
+            <a:pPr>
+              <a:spcAft>
+                <a:spcPts val="0"/>
+              </a:spcAft>
+            </a:pPr>
+            <a:r>
+              <a:rPr lang="en-GB" sz="2800" kern="1400" dirty="0">
+                <a:solidFill>
+                  <a:srgbClr val="000000"/>
+                </a:solidFill>
+                <a:latin typeface="Arial" panose="020B0604020202020204" pitchFamily="34" charset="0"/>
+                <a:ea typeface="Times New Roman" panose="02020603050405020304" pitchFamily="18" charset="0"/>
+                <a:cs typeface="Arial" panose="020B0604020202020204" pitchFamily="34" charset="0"/>
+              </a:rPr>
+              <a:t>Other 	n = 23</a:t>
+            </a:r>
+            <a:endParaRPr lang="en-CA" sz="2800" kern="1400" dirty="0">
+              <a:solidFill>
+                <a:srgbClr val="000000"/>
+              </a:solidFill>
+              <a:latin typeface="Arial" panose="020B0604020202020204" pitchFamily="34" charset="0"/>
+              <a:ea typeface="Times New Roman" panose="02020603050405020304" pitchFamily="18" charset="0"/>
+              <a:cs typeface="Arial" panose="020B0604020202020204" pitchFamily="34" charset="0"/>
+            </a:endParaRPr>
+          </a:p>
+        </p:txBody>
+      </p:sp>
+      <p:sp>
+        <p:nvSpPr>
+          <p:cNvPr id="84" name="Rectangle 83">
             <a:extLst>
               <a:ext uri="{FF2B5EF4-FFF2-40B4-BE49-F238E27FC236}">
-                <a16:creationId xmlns:a16="http://schemas.microsoft.com/office/drawing/2014/main" id="{0FF443AD-2CB0-40CD-80C1-ED319C1968C1}"/>
+                <a16:creationId xmlns:a16="http://schemas.microsoft.com/office/drawing/2014/main" id="{3E7849FE-51A3-4EF1-90A9-F68B619B69EA}"/>
               </a:ext>
             </a:extLst>
           </p:cNvPr>
-          <p:cNvCxnSpPr>
-            <a:cxnSpLocks noChangeShapeType="1"/>
-          </p:cNvCxnSpPr>
+          <p:cNvSpPr/>
           <p:nvPr/>
-        </p:nvCxnSpPr>
-        <p:spPr bwMode="auto">
+        </p:nvSpPr>
+        <p:spPr>
           <a:xfrm>
-            <a:off x="5441662" y="26191338"/>
-            <a:ext cx="3094628" cy="0"/>
+            <a:off x="2245338" y="22847379"/>
+            <a:ext cx="6060183" cy="1077218"/>
           </a:xfrm>
-          <a:prstGeom prst="straightConnector1">
+          <a:prstGeom prst="rect">
             <a:avLst/>
           </a:prstGeom>
           <a:gradFill flip="none" rotWithShape="1">
@@ -16722,31 +16209,59 @@
                 </a:srgbClr>
               </a:gs>
             </a:gsLst>
-            <a:path path="circle">
-              <a:fillToRect t="100000" r="100000"/>
-            </a:path>
-            <a:tileRect l="-100000" b="-100000"/>
+            <a:lin ang="5400000" scaled="1"/>
+            <a:tileRect/>
           </a:gradFill>
-          <a:ln w="38100">
-            <a:headEnd/>
-            <a:tailEnd type="triangle" w="med" len="med"/>
-          </a:ln>
+          <a:ln/>
         </p:spPr>
         <p:style>
           <a:lnRef idx="1">
-            <a:schemeClr val="dk1"/>
+            <a:schemeClr val="accent1"/>
           </a:lnRef>
-          <a:fillRef idx="0">
-            <a:schemeClr val="dk1"/>
+          <a:fillRef idx="2">
+            <a:schemeClr val="accent1"/>
           </a:fillRef>
-          <a:effectRef idx="0">
-            <a:schemeClr val="dk1"/>
+          <a:effectRef idx="1">
+            <a:schemeClr val="accent1"/>
           </a:effectRef>
           <a:fontRef idx="minor">
-            <a:schemeClr val="tx1"/>
+            <a:schemeClr val="dk1"/>
           </a:fontRef>
         </p:style>
-      </p:cxnSp>
+        <p:txBody>
+          <a:bodyPr wrap="square">
+            <a:spAutoFit/>
+          </a:bodyPr>
+          <a:lstStyle/>
+          <a:p>
+            <a:pPr algn="ctr">
+              <a:spcAft>
+                <a:spcPts val="0"/>
+              </a:spcAft>
+            </a:pPr>
+            <a:r>
+              <a:rPr lang="en-CA" sz="3200" kern="1400" dirty="0">
+                <a:solidFill>
+                  <a:srgbClr val="000000"/>
+                </a:solidFill>
+                <a:latin typeface="Arial" panose="020B0604020202020204" pitchFamily="34" charset="0"/>
+                <a:ea typeface="Times New Roman" panose="02020603050405020304" pitchFamily="18" charset="0"/>
+                <a:cs typeface="Arial" panose="020B0604020202020204" pitchFamily="34" charset="0"/>
+              </a:rPr>
+              <a:t>Observational epidemiology studies (n =  178)</a:t>
+            </a:r>
+            <a:endParaRPr lang="en-GB" sz="3200" kern="1400" dirty="0">
+              <a:solidFill>
+                <a:srgbClr val="000000"/>
+              </a:solidFill>
+              <a:effectLst/>
+              <a:latin typeface="Arial" panose="020B0604020202020204" pitchFamily="34" charset="0"/>
+              <a:ea typeface="Times New Roman" panose="02020603050405020304" pitchFamily="18" charset="0"/>
+              <a:cs typeface="Arial" panose="020B0604020202020204" pitchFamily="34" charset="0"/>
+            </a:endParaRPr>
+          </a:p>
+        </p:txBody>
+      </p:sp>
       <p:sp>
         <p:nvSpPr>
           <p:cNvPr id="95" name="Rectangle 94">
@@ -16761,76 +16276,10 @@
         </p:nvSpPr>
         <p:spPr>
           <a:xfrm>
-            <a:off x="1962357" y="26519598"/>
-            <a:ext cx="6351265" cy="584775"/>
+            <a:off x="2245266" y="24320450"/>
+            <a:ext cx="6060183" cy="584775"/>
           </a:xfrm>
           <a:prstGeom prst="rect">
-            <a:avLst/>
-          </a:prstGeom>
-          <a:solidFill>
-            <a:srgbClr val="FFFF19"/>
-          </a:solidFill>
-          <a:ln cap="rnd">
-            <a:noFill/>
-          </a:ln>
-          <a:effectLst>
-            <a:softEdge rad="0"/>
-          </a:effectLst>
-        </p:spPr>
-        <p:txBody>
-          <a:bodyPr wrap="square">
-            <a:spAutoFit/>
-          </a:bodyPr>
-          <a:lstStyle/>
-          <a:p>
-            <a:pPr algn="ctr">
-              <a:spcAft>
-                <a:spcPts val="0"/>
-              </a:spcAft>
-            </a:pPr>
-            <a:r>
-              <a:rPr lang="en-CA" sz="3200" kern="1400" dirty="0">
-                <a:solidFill>
-                  <a:srgbClr val="000000"/>
-                </a:solidFill>
-                <a:latin typeface="Arial" panose="020B0604020202020204" pitchFamily="34" charset="0"/>
-                <a:ea typeface="Times New Roman" panose="02020603050405020304" pitchFamily="18" charset="0"/>
-                <a:cs typeface="Arial" panose="020B0604020202020204" pitchFamily="34" charset="0"/>
-              </a:rPr>
-              <a:t>Random sample (n =  90)</a:t>
-            </a:r>
-            <a:endParaRPr lang="en-GB" sz="3200" kern="1400" dirty="0">
-              <a:solidFill>
-                <a:srgbClr val="000000"/>
-              </a:solidFill>
-              <a:effectLst/>
-              <a:latin typeface="Arial" panose="020B0604020202020204" pitchFamily="34" charset="0"/>
-              <a:ea typeface="Times New Roman" panose="02020603050405020304" pitchFamily="18" charset="0"/>
-              <a:cs typeface="Arial" panose="020B0604020202020204" pitchFamily="34" charset="0"/>
-            </a:endParaRPr>
-          </a:p>
-        </p:txBody>
-      </p:sp>
-      <p:cxnSp>
-        <p:nvCxnSpPr>
-          <p:cNvPr id="96" name="AutoShape 2">
-            <a:extLst>
-              <a:ext uri="{FF2B5EF4-FFF2-40B4-BE49-F238E27FC236}">
-                <a16:creationId xmlns:a16="http://schemas.microsoft.com/office/drawing/2014/main" id="{9E422149-DDB1-4037-887E-A1249793CCEC}"/>
-              </a:ext>
-            </a:extLst>
-          </p:cNvPr>
-          <p:cNvCxnSpPr>
-            <a:cxnSpLocks noChangeShapeType="1"/>
-          </p:cNvCxnSpPr>
-          <p:nvPr/>
-        </p:nvCxnSpPr>
-        <p:spPr bwMode="auto">
-          <a:xfrm flipH="1">
-            <a:off x="5029507" y="26015843"/>
-            <a:ext cx="6" cy="350991"/>
-          </a:xfrm>
-          <a:prstGeom prst="straightConnector1">
             <a:avLst/>
           </a:prstGeom>
           <a:gradFill flip="none" rotWithShape="1">
@@ -16854,38 +16303,59 @@
                 </a:srgbClr>
               </a:gs>
             </a:gsLst>
-            <a:path path="circle">
-              <a:fillToRect t="100000" r="100000"/>
-            </a:path>
-            <a:tileRect l="-100000" b="-100000"/>
+            <a:lin ang="5400000" scaled="1"/>
+            <a:tileRect/>
           </a:gradFill>
-          <a:ln w="57150">
-            <a:solidFill>
-              <a:srgbClr val="000000"/>
-            </a:solidFill>
-            <a:round/>
-            <a:headEnd/>
-            <a:tailEnd type="triangle" w="med" len="med"/>
-          </a:ln>
-          <a:effectLst/>
-          <a:extLst>
-            <a:ext uri="{909E8E84-426E-40DD-AFC4-6F175D3DCCD1}">
-              <a14:hiddenFill xmlns:a14="http://schemas.microsoft.com/office/drawing/2010/main">
-                <a:noFill/>
-              </a14:hiddenFill>
-            </a:ext>
-            <a:ext uri="{AF507438-7753-43E0-B8FC-AC1667EBCBE1}">
-              <a14:hiddenEffects xmlns:a14="http://schemas.microsoft.com/office/drawing/2010/main">
-                <a:effectLst>
-                  <a:outerShdw dist="35921" dir="2700000" algn="ctr" rotWithShape="0">
-                    <a:srgbClr val="CCCCCC"/>
-                  </a:outerShdw>
-                </a:effectLst>
-              </a14:hiddenEffects>
-            </a:ext>
-          </a:extLst>
+          <a:ln/>
         </p:spPr>
-      </p:cxnSp>
+        <p:style>
+          <a:lnRef idx="1">
+            <a:schemeClr val="accent1"/>
+          </a:lnRef>
+          <a:fillRef idx="2">
+            <a:schemeClr val="accent1"/>
+          </a:fillRef>
+          <a:effectRef idx="1">
+            <a:schemeClr val="accent1"/>
+          </a:effectRef>
+          <a:fontRef idx="minor">
+            <a:schemeClr val="dk1"/>
+          </a:fontRef>
+        </p:style>
+        <p:txBody>
+          <a:bodyPr wrap="square">
+            <a:spAutoFit/>
+          </a:bodyPr>
+          <a:lstStyle/>
+          <a:p>
+            <a:pPr algn="ctr">
+              <a:spcAft>
+                <a:spcPts val="0"/>
+              </a:spcAft>
+            </a:pPr>
+            <a:r>
+              <a:rPr lang="en-CA" sz="3200" kern="1400" dirty="0">
+                <a:solidFill>
+                  <a:srgbClr val="000000"/>
+                </a:solidFill>
+                <a:latin typeface="Arial" panose="020B0604020202020204" pitchFamily="34" charset="0"/>
+                <a:ea typeface="Times New Roman" panose="02020603050405020304" pitchFamily="18" charset="0"/>
+                <a:cs typeface="Arial" panose="020B0604020202020204" pitchFamily="34" charset="0"/>
+              </a:rPr>
+              <a:t>Random sample (n =  90)</a:t>
+            </a:r>
+            <a:endParaRPr lang="en-GB" sz="3200" kern="1400" dirty="0">
+              <a:solidFill>
+                <a:srgbClr val="000000"/>
+              </a:solidFill>
+              <a:effectLst/>
+              <a:latin typeface="Arial" panose="020B0604020202020204" pitchFamily="34" charset="0"/>
+              <a:ea typeface="Times New Roman" panose="02020603050405020304" pitchFamily="18" charset="0"/>
+              <a:cs typeface="Arial" panose="020B0604020202020204" pitchFamily="34" charset="0"/>
+            </a:endParaRPr>
+          </a:p>
+        </p:txBody>
+      </p:sp>
       <p:sp>
         <p:nvSpPr>
           <p:cNvPr id="97" name="Rectangle 96">
@@ -16900,22 +16370,52 @@
         </p:nvSpPr>
         <p:spPr>
           <a:xfrm>
-            <a:off x="8675816" y="25243586"/>
+            <a:off x="8881711" y="23751699"/>
             <a:ext cx="5154747" cy="2062103"/>
           </a:xfrm>
           <a:prstGeom prst="rect">
             <a:avLst/>
           </a:prstGeom>
-          <a:solidFill>
-            <a:srgbClr val="FFFF19"/>
-          </a:solidFill>
-          <a:ln cap="rnd">
-            <a:noFill/>
-          </a:ln>
-          <a:effectLst>
-            <a:softEdge rad="0"/>
-          </a:effectLst>
+          <a:gradFill flip="none" rotWithShape="1">
+            <a:gsLst>
+              <a:gs pos="0">
+                <a:srgbClr val="FFFF09">
+                  <a:tint val="66000"/>
+                  <a:satMod val="160000"/>
+                </a:srgbClr>
+              </a:gs>
+              <a:gs pos="50000">
+                <a:srgbClr val="FFFF09">
+                  <a:tint val="44500"/>
+                  <a:satMod val="160000"/>
+                </a:srgbClr>
+              </a:gs>
+              <a:gs pos="100000">
+                <a:srgbClr val="FFFF09">
+                  <a:tint val="23500"/>
+                  <a:satMod val="160000"/>
+                </a:srgbClr>
+              </a:gs>
+            </a:gsLst>
+            <a:lin ang="5400000" scaled="1"/>
+            <a:tileRect/>
+          </a:gradFill>
+          <a:ln/>
         </p:spPr>
+        <p:style>
+          <a:lnRef idx="1">
+            <a:schemeClr val="accent1"/>
+          </a:lnRef>
+          <a:fillRef idx="2">
+            <a:schemeClr val="accent1"/>
+          </a:fillRef>
+          <a:effectRef idx="1">
+            <a:schemeClr val="accent1"/>
+          </a:effectRef>
+          <a:fontRef idx="minor">
+            <a:schemeClr val="dk1"/>
+          </a:fontRef>
+        </p:style>
         <p:txBody>
           <a:bodyPr wrap="square">
             <a:spAutoFit/>
@@ -17009,8 +16509,8 @@
         </p:nvSpPr>
         <p:spPr>
           <a:xfrm>
-            <a:off x="606709" y="27346976"/>
-            <a:ext cx="14742310" cy="2819912"/>
+            <a:off x="421327" y="25699363"/>
+            <a:ext cx="14742310" cy="5805345"/>
           </a:xfrm>
           <a:prstGeom prst="rect">
             <a:avLst/>
@@ -17023,25 +16523,47 @@
           <a:lstStyle/>
           <a:p>
             <a:r>
-              <a:rPr lang="en-GB" sz="3400" dirty="0">
+              <a:rPr lang="en-GB" sz="3300" dirty="0">
                 <a:latin typeface="Arial" panose="020B0604020202020204" pitchFamily="34" charset="0"/>
                 <a:cs typeface="Arial" panose="020B0604020202020204" pitchFamily="34" charset="0"/>
               </a:rPr>
               <a:t>We identified the study designs in the observational epidemiology articles and will assess the reporting quality of 90 articles using the STROBE guidelines</a:t>
             </a:r>
             <a:r>
-              <a:rPr lang="en-GB" sz="3400" baseline="30000" dirty="0">
+              <a:rPr lang="en-GB" sz="3300" baseline="30000" dirty="0">
                 <a:latin typeface="Arial" panose="020B0604020202020204" pitchFamily="34" charset="0"/>
                 <a:cs typeface="Arial" panose="020B0604020202020204" pitchFamily="34" charset="0"/>
               </a:rPr>
               <a:t> </a:t>
             </a:r>
             <a:r>
-              <a:rPr lang="en-GB" sz="3400" dirty="0">
+              <a:rPr lang="en-GB" sz="3300" dirty="0">
                 <a:latin typeface="Arial" panose="020B0604020202020204" pitchFamily="34" charset="0"/>
                 <a:cs typeface="Arial" panose="020B0604020202020204" pitchFamily="34" charset="0"/>
               </a:rPr>
               <a:t>(von Elm et al., 2017). KD and MG screened, classified and will extract data on reporting. RR resolved disagreements between them.</a:t>
+            </a:r>
+          </a:p>
+          <a:p>
+            <a:endParaRPr lang="en-GB" sz="3300" dirty="0">
+              <a:latin typeface="Arial" panose="020B0604020202020204" pitchFamily="34" charset="0"/>
+              <a:cs typeface="Arial" panose="020B0604020202020204" pitchFamily="34" charset="0"/>
+            </a:endParaRPr>
+          </a:p>
+          <a:p>
+            <a:r>
+              <a:rPr lang="en-GB" sz="3300" dirty="0">
+                <a:latin typeface="Arial" panose="020B0604020202020204" pitchFamily="34" charset="0"/>
+                <a:cs typeface="Arial" panose="020B0604020202020204" pitchFamily="34" charset="0"/>
+              </a:rPr>
+              <a:t>The data here are from 32 articles KD assessed</a:t>
+            </a:r>
+            <a:r>
+              <a:rPr lang="en-US" sz="3300" dirty="0">
+                <a:latin typeface="Arial" panose="020B0604020202020204" pitchFamily="34" charset="0"/>
+                <a:cs typeface="Arial" panose="020B0604020202020204" pitchFamily="34" charset="0"/>
+              </a:rPr>
+              <a:t>. They may change after duplicate extraction. Designs include 2 case-control, 11 cohort,18 cross-sectional and 1 with cohort and cross-sectional analyses. 27 had UK based corresponding authors with the other 5 across different countries. 4 articles were published in 2014, 4 in 2015, 8 in 2016, 13 in 2018 and 1 in 2019. </a:t>
             </a:r>
           </a:p>
         </p:txBody>
@@ -17061,13 +16583,13 @@
           <p:nvPr>
             <p:extLst>
               <p:ext uri="{D42A27DB-BD31-4B8C-83A1-F6EECF244321}">
-                <p14:modId xmlns:p14="http://schemas.microsoft.com/office/powerpoint/2010/main" val="1513762892"/>
+                <p14:modId xmlns:p14="http://schemas.microsoft.com/office/powerpoint/2010/main" val="3037867311"/>
               </p:ext>
             </p:extLst>
           </p:nvPr>
         </p:nvGraphicFramePr>
         <p:xfrm>
-          <a:off x="16035967" y="10539258"/>
+          <a:off x="1270783" y="31616396"/>
           <a:ext cx="12856391" cy="7202804"/>
         </p:xfrm>
         <a:graphic>
@@ -17548,14 +17070,14 @@
                         </a:spcAft>
                       </a:pPr>
                       <a:r>
-                        <a:rPr lang="en-GB" sz="3200" b="0">
+                        <a:rPr lang="en-GB" sz="3200" b="0" dirty="0">
                           <a:effectLst/>
                           <a:latin typeface="Arial" panose="020B0604020202020204" pitchFamily="34" charset="0"/>
                           <a:cs typeface="Arial" panose="020B0604020202020204" pitchFamily="34" charset="0"/>
                         </a:rPr>
                         <a:t>2 (6.2)</a:t>
                       </a:r>
-                      <a:endParaRPr lang="en-GB" sz="3200" b="0">
+                      <a:endParaRPr lang="en-GB" sz="3200" b="0" dirty="0">
                         <a:effectLst/>
                         <a:latin typeface="Arial" panose="020B0604020202020204" pitchFamily="34" charset="0"/>
                         <a:ea typeface="DengXian" panose="02010600030101010101" pitchFamily="2" charset="-122"/>
@@ -17617,14 +17139,14 @@
                         </a:spcAft>
                       </a:pPr>
                       <a:r>
-                        <a:rPr lang="en-GB" sz="3200" b="0">
+                        <a:rPr lang="en-GB" sz="3200" b="0" dirty="0">
                           <a:effectLst/>
                           <a:latin typeface="Arial" panose="020B0604020202020204" pitchFamily="34" charset="0"/>
                           <a:cs typeface="Arial" panose="020B0604020202020204" pitchFamily="34" charset="0"/>
                         </a:rPr>
                         <a:t>25 (78.1)</a:t>
                       </a:r>
-                      <a:endParaRPr lang="en-GB" sz="3200" b="0">
+                      <a:endParaRPr lang="en-GB" sz="3200" b="0" dirty="0">
                         <a:effectLst/>
                         <a:latin typeface="Arial" panose="020B0604020202020204" pitchFamily="34" charset="0"/>
                         <a:ea typeface="DengXian" panose="02010600030101010101" pitchFamily="2" charset="-122"/>
@@ -17824,14 +17346,14 @@
                         </a:spcAft>
                       </a:pPr>
                       <a:r>
-                        <a:rPr lang="en-GB" sz="3200" b="0">
+                        <a:rPr lang="en-GB" sz="3200" b="0" dirty="0">
                           <a:effectLst/>
                           <a:latin typeface="Arial" panose="020B0604020202020204" pitchFamily="34" charset="0"/>
                           <a:cs typeface="Arial" panose="020B0604020202020204" pitchFamily="34" charset="0"/>
                         </a:rPr>
                         <a:t>2 (6.2)</a:t>
                       </a:r>
-                      <a:endParaRPr lang="en-GB" sz="3200" b="0">
+                      <a:endParaRPr lang="en-GB" sz="3200" b="0" dirty="0">
                         <a:effectLst/>
                         <a:latin typeface="Arial" panose="020B0604020202020204" pitchFamily="34" charset="0"/>
                         <a:ea typeface="DengXian" panose="02010600030101010101" pitchFamily="2" charset="-122"/>
@@ -17893,14 +17415,14 @@
                         </a:spcAft>
                       </a:pPr>
                       <a:r>
-                        <a:rPr lang="en-GB" sz="3200" b="0">
+                        <a:rPr lang="en-GB" sz="3200" b="0" dirty="0">
                           <a:effectLst/>
                           <a:latin typeface="Arial" panose="020B0604020202020204" pitchFamily="34" charset="0"/>
                           <a:cs typeface="Arial" panose="020B0604020202020204" pitchFamily="34" charset="0"/>
                         </a:rPr>
                         <a:t>15 (46.9)</a:t>
                       </a:r>
-                      <a:endParaRPr lang="en-GB" sz="3200" b="0">
+                      <a:endParaRPr lang="en-GB" sz="3200" b="0" dirty="0">
                         <a:effectLst/>
                         <a:latin typeface="Arial" panose="020B0604020202020204" pitchFamily="34" charset="0"/>
                         <a:ea typeface="DengXian" panose="02010600030101010101" pitchFamily="2" charset="-122"/>
@@ -17962,14 +17484,14 @@
                         </a:spcAft>
                       </a:pPr>
                       <a:r>
-                        <a:rPr lang="en-GB" sz="3200" b="0">
+                        <a:rPr lang="en-GB" sz="3200" b="0" dirty="0">
                           <a:effectLst/>
                           <a:latin typeface="Arial" panose="020B0604020202020204" pitchFamily="34" charset="0"/>
                           <a:cs typeface="Arial" panose="020B0604020202020204" pitchFamily="34" charset="0"/>
                         </a:rPr>
                         <a:t>18 (56.2)</a:t>
                       </a:r>
-                      <a:endParaRPr lang="en-GB" sz="3200" b="0">
+                      <a:endParaRPr lang="en-GB" sz="3200" b="0" dirty="0">
                         <a:effectLst/>
                         <a:latin typeface="Arial" panose="020B0604020202020204" pitchFamily="34" charset="0"/>
                         <a:ea typeface="DengXian" panose="02010600030101010101" pitchFamily="2" charset="-122"/>
@@ -18073,7 +17595,7 @@
           <p:nvPr/>
         </p:nvPicPr>
         <p:blipFill>
-          <a:blip r:embed="rId10">
+          <a:blip r:embed="rId8">
             <a:extLst>
               <a:ext uri="{28A0092B-C50C-407E-A947-70E740481C1C}">
                 <a14:useLocalDpi xmlns:a14="http://schemas.microsoft.com/office/drawing/2010/main" val="0"/>
@@ -18121,7 +17643,7 @@
         </p:nvSpPr>
         <p:spPr>
           <a:xfrm>
-            <a:off x="15263263" y="37350737"/>
+            <a:off x="15263263" y="37645707"/>
             <a:ext cx="14401801" cy="590675"/>
           </a:xfrm>
           <a:custGeom>
@@ -18474,36 +17996,6 @@
           </a:p>
         </p:txBody>
       </p:sp>
-      <p:pic>
-        <p:nvPicPr>
-          <p:cNvPr id="101" name="Picture 100">
-            <a:extLst>
-              <a:ext uri="{FF2B5EF4-FFF2-40B4-BE49-F238E27FC236}">
-                <a16:creationId xmlns:a16="http://schemas.microsoft.com/office/drawing/2014/main" id="{354860C7-84E6-41F6-8EA2-40A8DC8FDB04}"/>
-              </a:ext>
-            </a:extLst>
-          </p:cNvPr>
-          <p:cNvPicPr>
-            <a:picLocks noChangeAspect="1"/>
-          </p:cNvPicPr>
-          <p:nvPr/>
-        </p:nvPicPr>
-        <p:blipFill>
-          <a:blip r:embed="rId11"/>
-          <a:stretch>
-            <a:fillRect/>
-          </a:stretch>
-        </p:blipFill>
-        <p:spPr>
-          <a:xfrm>
-            <a:off x="1450014" y="30509159"/>
-            <a:ext cx="26840193" cy="6549007"/>
-          </a:xfrm>
-          <a:prstGeom prst="rect">
-            <a:avLst/>
-          </a:prstGeom>
-        </p:spPr>
-      </p:pic>
       <p:sp>
         <p:nvSpPr>
           <p:cNvPr id="105" name="Rectangle 104">
@@ -18518,8 +18010,8 @@
         </p:nvSpPr>
         <p:spPr>
           <a:xfrm>
-            <a:off x="671182" y="37272836"/>
-            <a:ext cx="14131421" cy="1661993"/>
+            <a:off x="15318024" y="6710403"/>
+            <a:ext cx="14131421" cy="5324535"/>
           </a:xfrm>
           <a:prstGeom prst="rect">
             <a:avLst/>
@@ -18531,391 +18023,529 @@
           </a:bodyPr>
           <a:lstStyle/>
           <a:p>
-            <a:endParaRPr lang="en-US" sz="3400" dirty="0">
-              <a:latin typeface="Arial" panose="020B0604020202020204" pitchFamily="34" charset="0"/>
-              <a:cs typeface="Arial" panose="020B0604020202020204" pitchFamily="34" charset="0"/>
-            </a:endParaRPr>
-          </a:p>
-          <a:p>
             <a:r>
               <a:rPr lang="en-US" sz="3400" dirty="0">
                 <a:latin typeface="Arial" panose="020B0604020202020204" pitchFamily="34" charset="0"/>
                 <a:cs typeface="Arial" panose="020B0604020202020204" pitchFamily="34" charset="0"/>
               </a:rPr>
-              <a:t>NOTE: The STROBE guidelines contain 22 items. Figure 2 and 3 contain 20 items because 2 did not apply to any of the articles.</a:t>
+              <a:t>The STROBE guidelines contain 22 items. Figure 1 contains 20 items because 2 did not apply to any of the articles</a:t>
+            </a:r>
+          </a:p>
+          <a:p>
+            <a:pPr marL="457200" indent="-457200">
+              <a:buFont typeface="Arial" panose="020B0604020202020204" pitchFamily="34" charset="0"/>
+              <a:buChar char="•"/>
+            </a:pPr>
+            <a:r>
+              <a:rPr lang="en-US" sz="3400" dirty="0">
+                <a:latin typeface="Arial" panose="020B0604020202020204" pitchFamily="34" charset="0"/>
+                <a:cs typeface="Arial" panose="020B0604020202020204" pitchFamily="34" charset="0"/>
+              </a:rPr>
+              <a:t>All, or almost all, articles reported study objectives, explained the design early on, summarised results and described their statistical methods. </a:t>
+            </a:r>
+          </a:p>
+          <a:p>
+            <a:pPr marL="457200" indent="-457200">
+              <a:buFont typeface="Arial" panose="020B0604020202020204" pitchFamily="34" charset="0"/>
+              <a:buChar char="•"/>
+            </a:pPr>
+            <a:r>
+              <a:rPr lang="en-US" sz="3400" dirty="0">
+                <a:latin typeface="Arial" panose="020B0604020202020204" pitchFamily="34" charset="0"/>
+                <a:cs typeface="Arial" panose="020B0604020202020204" pitchFamily="34" charset="0"/>
+              </a:rPr>
+              <a:t>Almost no studies fully reported their: results, rationale for confounders, variable handling in analyses, funding or the setting. Few gave absolute risk estimates.</a:t>
+            </a:r>
+          </a:p>
+          <a:p>
+            <a:pPr marL="457200" indent="-457200">
+              <a:buFont typeface="Arial" panose="020B0604020202020204" pitchFamily="34" charset="0"/>
+              <a:buChar char="•"/>
+            </a:pPr>
+            <a:r>
+              <a:rPr lang="en-US" sz="3400" dirty="0">
+                <a:latin typeface="Arial" panose="020B0604020202020204" pitchFamily="34" charset="0"/>
+                <a:cs typeface="Arial" panose="020B0604020202020204" pitchFamily="34" charset="0"/>
+              </a:rPr>
+              <a:t>Though most cohort studies </a:t>
+            </a:r>
+            <a:r>
+              <a:rPr lang="en-US" sz="3400" dirty="0" err="1">
+                <a:latin typeface="Arial" panose="020B0604020202020204" pitchFamily="34" charset="0"/>
+                <a:cs typeface="Arial" panose="020B0604020202020204" pitchFamily="34" charset="0"/>
+              </a:rPr>
+              <a:t>summarised</a:t>
+            </a:r>
+            <a:r>
+              <a:rPr lang="en-US" sz="3400" dirty="0">
+                <a:latin typeface="Arial" panose="020B0604020202020204" pitchFamily="34" charset="0"/>
+                <a:cs typeface="Arial" panose="020B0604020202020204" pitchFamily="34" charset="0"/>
+              </a:rPr>
+              <a:t> follow-up time none reported loss to follow-up. This may be because there was none. </a:t>
             </a:r>
           </a:p>
         </p:txBody>
       </p:sp>
-      <p:sp>
-        <p:nvSpPr>
-          <p:cNvPr id="119" name="Text Placeholder 7">
+      <p:pic>
+        <p:nvPicPr>
+          <p:cNvPr id="46" name="Picture 45" descr="A screenshot of a cell phone&#10;&#10;Description automatically generated">
             <a:extLst>
               <a:ext uri="{FF2B5EF4-FFF2-40B4-BE49-F238E27FC236}">
-                <a16:creationId xmlns:a16="http://schemas.microsoft.com/office/drawing/2014/main" id="{19E6BB7B-6E4E-4C6C-A869-FD947F79E20A}"/>
+                <a16:creationId xmlns:a16="http://schemas.microsoft.com/office/drawing/2014/main" id="{A2743903-BD27-4843-88E8-832DE634CF9C}"/>
               </a:ext>
             </a:extLst>
           </p:cNvPr>
-          <p:cNvSpPr txBox="1">
-            <a:spLocks/>
-          </p:cNvSpPr>
+          <p:cNvPicPr>
+            <a:picLocks noChangeAspect="1"/>
+          </p:cNvPicPr>
           <p:nvPr/>
-        </p:nvSpPr>
+        </p:nvPicPr>
+        <p:blipFill>
+          <a:blip r:embed="rId9">
+            <a:extLst>
+              <a:ext uri="{28A0092B-C50C-407E-A947-70E740481C1C}">
+                <a14:useLocalDpi xmlns:a14="http://schemas.microsoft.com/office/drawing/2010/main" val="0"/>
+              </a:ext>
+            </a:extLst>
+          </a:blip>
+          <a:stretch>
+            <a:fillRect/>
+          </a:stretch>
+        </p:blipFill>
         <p:spPr>
           <a:xfrm>
-            <a:off x="15557499" y="6548627"/>
-            <a:ext cx="14401801" cy="590675"/>
+            <a:off x="15039266" y="12107105"/>
+            <a:ext cx="14767637" cy="18459547"/>
           </a:xfrm>
-          <a:custGeom>
+          <a:prstGeom prst="rect">
             <a:avLst/>
-            <a:gdLst>
-              <a:gd name="connsiteX0" fmla="*/ 0 w 14401801"/>
-              <a:gd name="connsiteY0" fmla="*/ 0 h 590675"/>
-              <a:gd name="connsiteX1" fmla="*/ 14401801 w 14401801"/>
-              <a:gd name="connsiteY1" fmla="*/ 0 h 590675"/>
-              <a:gd name="connsiteX2" fmla="*/ 14401801 w 14401801"/>
-              <a:gd name="connsiteY2" fmla="*/ 590675 h 590675"/>
-              <a:gd name="connsiteX3" fmla="*/ 0 w 14401801"/>
-              <a:gd name="connsiteY3" fmla="*/ 590675 h 590675"/>
-              <a:gd name="connsiteX4" fmla="*/ 0 w 14401801"/>
-              <a:gd name="connsiteY4" fmla="*/ 0 h 590675"/>
-            </a:gdLst>
-            <a:ahLst/>
-            <a:cxnLst>
-              <a:cxn ang="0">
-                <a:pos x="connsiteX0" y="connsiteY0"/>
-              </a:cxn>
-              <a:cxn ang="0">
-                <a:pos x="connsiteX1" y="connsiteY1"/>
-              </a:cxn>
-              <a:cxn ang="0">
-                <a:pos x="connsiteX2" y="connsiteY2"/>
-              </a:cxn>
-              <a:cxn ang="0">
-                <a:pos x="connsiteX3" y="connsiteY3"/>
-              </a:cxn>
-              <a:cxn ang="0">
-                <a:pos x="connsiteX4" y="connsiteY4"/>
-              </a:cxn>
-            </a:cxnLst>
-            <a:rect l="l" t="t" r="r" b="b"/>
-            <a:pathLst>
-              <a:path w="14401801" h="590675" fill="none" extrusionOk="0">
-                <a:moveTo>
-                  <a:pt x="0" y="0"/>
-                </a:moveTo>
-                <a:cubicBezTo>
-                  <a:pt x="1725329" y="-49533"/>
-                  <a:pt x="11386905" y="-14809"/>
-                  <a:pt x="14401801" y="0"/>
-                </a:cubicBezTo>
-                <a:cubicBezTo>
-                  <a:pt x="14400061" y="197462"/>
-                  <a:pt x="14349874" y="429951"/>
-                  <a:pt x="14401801" y="590675"/>
-                </a:cubicBezTo>
-                <a:cubicBezTo>
-                  <a:pt x="12860981" y="542444"/>
-                  <a:pt x="3895651" y="675130"/>
-                  <a:pt x="0" y="590675"/>
-                </a:cubicBezTo>
-                <a:cubicBezTo>
-                  <a:pt x="36137" y="381559"/>
-                  <a:pt x="-42208" y="226077"/>
-                  <a:pt x="0" y="0"/>
-                </a:cubicBezTo>
-                <a:close/>
-              </a:path>
-              <a:path w="14401801" h="590675" stroke="0" extrusionOk="0">
-                <a:moveTo>
-                  <a:pt x="0" y="0"/>
-                </a:moveTo>
-                <a:cubicBezTo>
-                  <a:pt x="4145292" y="118645"/>
-                  <a:pt x="11325409" y="116012"/>
-                  <a:pt x="14401801" y="0"/>
-                </a:cubicBezTo>
-                <a:cubicBezTo>
-                  <a:pt x="14422350" y="141798"/>
-                  <a:pt x="14369151" y="395644"/>
-                  <a:pt x="14401801" y="590675"/>
-                </a:cubicBezTo>
-                <a:cubicBezTo>
-                  <a:pt x="10513626" y="725275"/>
-                  <a:pt x="5305384" y="433479"/>
-                  <a:pt x="0" y="590675"/>
-                </a:cubicBezTo>
-                <a:cubicBezTo>
-                  <a:pt x="4502" y="431203"/>
-                  <a:pt x="30" y="228367"/>
-                  <a:pt x="0" y="0"/>
-                </a:cubicBezTo>
-                <a:close/>
-              </a:path>
-            </a:pathLst>
-          </a:custGeom>
-          <a:ln>
-            <a:solidFill>
-              <a:schemeClr val="accent5"/>
-            </a:solidFill>
+          </a:prstGeom>
+        </p:spPr>
+      </p:pic>
+      <p:cxnSp>
+        <p:nvCxnSpPr>
+          <p:cNvPr id="74" name="AutoShape 2">
             <a:extLst>
-              <a:ext uri="{C807C97D-BFC1-408E-A445-0C87EB9F89A2}">
-                <ask:lineSketchStyleProps xmlns:ask="http://schemas.microsoft.com/office/drawing/2018/sketchyshapes" sd="1219033472">
-                  <a:prstGeom prst="rect">
-                    <a:avLst/>
-                  </a:prstGeom>
-                  <ask:type>
-                    <ask:lineSketchCurved/>
-                  </ask:type>
-                </ask:lineSketchStyleProps>
+              <a:ext uri="{FF2B5EF4-FFF2-40B4-BE49-F238E27FC236}">
+                <a16:creationId xmlns:a16="http://schemas.microsoft.com/office/drawing/2014/main" id="{D55056D9-FCC7-42E4-83D8-38C6EAF477E9}"/>
               </a:ext>
             </a:extLst>
+          </p:cNvPr>
+          <p:cNvCxnSpPr>
+            <a:cxnSpLocks noChangeShapeType="1"/>
+          </p:cNvCxnSpPr>
+          <p:nvPr/>
+        </p:nvCxnSpPr>
+        <p:spPr bwMode="auto">
+          <a:xfrm flipH="1">
+            <a:off x="5333700" y="18434414"/>
+            <a:ext cx="6" cy="350991"/>
+          </a:xfrm>
+          <a:prstGeom prst="straightConnector1">
+            <a:avLst/>
+          </a:prstGeom>
+          <a:ln w="57150">
+            <a:headEnd/>
+            <a:tailEnd type="triangle" w="med" len="med"/>
           </a:ln>
+          <a:extLst>
+            <a:ext uri="{AF507438-7753-43E0-B8FC-AC1667EBCBE1}">
+              <a14:hiddenEffects xmlns:a14="http://schemas.microsoft.com/office/drawing/2010/main">
+                <a:effectLst>
+                  <a:outerShdw dist="35921" dir="2700000" algn="ctr" rotWithShape="0">
+                    <a:srgbClr val="CCCCCC"/>
+                  </a:outerShdw>
+                </a:effectLst>
+              </a14:hiddenEffects>
+            </a:ext>
+          </a:extLst>
         </p:spPr>
-        <p:txBody>
-          <a:bodyPr vert="horz" wrap="square" lIns="91440" tIns="45720" rIns="91440" bIns="45720" rtlCol="0">
-            <a:spAutoFit/>
-          </a:bodyPr>
-          <a:lstStyle>
-            <a:lvl1pPr marL="0" indent="0" algn="ctr" defTabSz="2270402" rtl="0" eaLnBrk="1" latinLnBrk="0" hangingPunct="1">
-              <a:lnSpc>
-                <a:spcPct val="90000"/>
-              </a:lnSpc>
-              <a:spcBef>
-                <a:spcPts val="3311"/>
-              </a:spcBef>
-              <a:buClr>
-                <a:schemeClr val="accent1"/>
-              </a:buClr>
-              <a:buSzPct val="80000"/>
-              <a:buFont typeface="Corbel" pitchFamily="34" charset="0"/>
-              <a:buNone/>
-              <a:defRPr lang="en-US" sz="3598" b="1" kern="1200" dirty="0">
-                <a:solidFill>
-                  <a:schemeClr val="accent1">
-                    <a:lumMod val="50000"/>
-                  </a:schemeClr>
-                </a:solidFill>
-                <a:latin typeface="+mj-lt"/>
-                <a:ea typeface="+mn-ea"/>
-                <a:cs typeface="+mn-cs"/>
-              </a:defRPr>
-            </a:lvl1pPr>
-            <a:lvl2pPr marL="1135201" indent="-454081" algn="l" defTabSz="2270402" rtl="0" eaLnBrk="1" latinLnBrk="0" hangingPunct="1">
-              <a:lnSpc>
-                <a:spcPct val="90000"/>
-              </a:lnSpc>
-              <a:spcBef>
-                <a:spcPts val="499"/>
-              </a:spcBef>
-              <a:spcAft>
-                <a:spcPts val="993"/>
-              </a:spcAft>
-              <a:buClr>
-                <a:schemeClr val="accent1"/>
-              </a:buClr>
-              <a:buSzPct val="80000"/>
-              <a:buFont typeface="Corbel" pitchFamily="34" charset="0"/>
-              <a:buChar char="•"/>
-              <a:defRPr lang="en-US" sz="3201" kern="1200" smtClean="0">
-                <a:solidFill>
-                  <a:schemeClr val="accent1"/>
-                </a:solidFill>
-                <a:latin typeface="+mn-lt"/>
-                <a:ea typeface="+mn-ea"/>
-                <a:cs typeface="+mn-cs"/>
-              </a:defRPr>
-            </a:lvl2pPr>
-            <a:lvl3pPr marL="1816321" indent="-454081" algn="l" defTabSz="2270402" rtl="0" eaLnBrk="1" latinLnBrk="0" hangingPunct="1">
-              <a:lnSpc>
-                <a:spcPct val="90000"/>
-              </a:lnSpc>
-              <a:spcBef>
-                <a:spcPts val="499"/>
-              </a:spcBef>
-              <a:spcAft>
-                <a:spcPts val="993"/>
-              </a:spcAft>
-              <a:buClr>
-                <a:schemeClr val="accent1"/>
-              </a:buClr>
-              <a:buSzPct val="80000"/>
-              <a:buFont typeface="Corbel" pitchFamily="34" charset="0"/>
-              <a:buChar char="•"/>
-              <a:defRPr lang="en-US" sz="2000" kern="1200" smtClean="0">
-                <a:solidFill>
-                  <a:schemeClr val="accent1"/>
-                </a:solidFill>
-                <a:latin typeface="+mn-lt"/>
-                <a:ea typeface="+mn-ea"/>
-                <a:cs typeface="+mn-cs"/>
-              </a:defRPr>
-            </a:lvl3pPr>
-            <a:lvl4pPr marL="2497445" indent="-454081" algn="l" defTabSz="2270402" rtl="0" eaLnBrk="1" latinLnBrk="0" hangingPunct="1">
-              <a:lnSpc>
-                <a:spcPct val="90000"/>
-              </a:lnSpc>
-              <a:spcBef>
-                <a:spcPts val="499"/>
-              </a:spcBef>
-              <a:spcAft>
-                <a:spcPts val="993"/>
-              </a:spcAft>
-              <a:buClr>
-                <a:schemeClr val="accent1"/>
-              </a:buClr>
-              <a:buSzPct val="80000"/>
-              <a:buFont typeface="Corbel" pitchFamily="34" charset="0"/>
-              <a:buChar char="•"/>
-              <a:defRPr lang="en-US" sz="1598" kern="1200" smtClean="0">
-                <a:solidFill>
-                  <a:schemeClr val="accent1"/>
-                </a:solidFill>
-                <a:latin typeface="+mn-lt"/>
-                <a:ea typeface="+mn-ea"/>
-                <a:cs typeface="+mn-cs"/>
-              </a:defRPr>
-            </a:lvl4pPr>
-            <a:lvl5pPr marL="3046140" indent="-454081" algn="l" defTabSz="2270402" rtl="0" eaLnBrk="1" latinLnBrk="0" hangingPunct="1">
-              <a:lnSpc>
-                <a:spcPct val="90000"/>
-              </a:lnSpc>
-              <a:spcBef>
-                <a:spcPts val="499"/>
-              </a:spcBef>
-              <a:spcAft>
-                <a:spcPts val="993"/>
-              </a:spcAft>
-              <a:buClr>
-                <a:schemeClr val="accent1"/>
-              </a:buClr>
-              <a:buSzPct val="80000"/>
-              <a:buFont typeface="Corbel" pitchFamily="34" charset="0"/>
-              <a:buChar char="•"/>
-              <a:defRPr lang="en-US" sz="1598" kern="1200">
-                <a:solidFill>
-                  <a:schemeClr val="accent1"/>
-                </a:solidFill>
-                <a:latin typeface="+mn-lt"/>
-                <a:ea typeface="+mn-ea"/>
-                <a:cs typeface="+mn-cs"/>
-              </a:defRPr>
-            </a:lvl5pPr>
-            <a:lvl6pPr marL="3641652" indent="-567603" algn="l" defTabSz="2270402" rtl="0" eaLnBrk="1" latinLnBrk="0" hangingPunct="1">
-              <a:lnSpc>
-                <a:spcPct val="90000"/>
-              </a:lnSpc>
-              <a:spcBef>
-                <a:spcPts val="499"/>
-              </a:spcBef>
-              <a:spcAft>
-                <a:spcPts val="993"/>
-              </a:spcAft>
-              <a:buClr>
-                <a:schemeClr val="accent1"/>
-              </a:buClr>
-              <a:buSzPct val="80000"/>
-              <a:buFont typeface="Corbel" pitchFamily="34" charset="0"/>
-              <a:buChar char="•"/>
-              <a:defRPr sz="4635" kern="1200">
-                <a:solidFill>
-                  <a:schemeClr val="accent1"/>
-                </a:solidFill>
-                <a:latin typeface="+mn-lt"/>
-                <a:ea typeface="+mn-ea"/>
-                <a:cs typeface="+mn-cs"/>
-              </a:defRPr>
-            </a:lvl6pPr>
-            <a:lvl7pPr marL="4303771" indent="-567603" algn="l" defTabSz="2270402" rtl="0" eaLnBrk="1" latinLnBrk="0" hangingPunct="1">
-              <a:lnSpc>
-                <a:spcPct val="90000"/>
-              </a:lnSpc>
-              <a:spcBef>
-                <a:spcPts val="499"/>
-              </a:spcBef>
-              <a:spcAft>
-                <a:spcPts val="993"/>
-              </a:spcAft>
-              <a:buClr>
-                <a:schemeClr val="accent1"/>
-              </a:buClr>
-              <a:buSzPct val="80000"/>
-              <a:buFont typeface="Corbel" pitchFamily="34" charset="0"/>
-              <a:buChar char="•"/>
-              <a:defRPr sz="4635" kern="1200">
-                <a:solidFill>
-                  <a:schemeClr val="accent1"/>
-                </a:solidFill>
-                <a:latin typeface="+mn-lt"/>
-                <a:ea typeface="+mn-ea"/>
-                <a:cs typeface="+mn-cs"/>
-              </a:defRPr>
-            </a:lvl7pPr>
-            <a:lvl8pPr marL="4965886" indent="-567603" algn="l" defTabSz="2270402" rtl="0" eaLnBrk="1" latinLnBrk="0" hangingPunct="1">
-              <a:lnSpc>
-                <a:spcPct val="90000"/>
-              </a:lnSpc>
-              <a:spcBef>
-                <a:spcPts val="499"/>
-              </a:spcBef>
-              <a:spcAft>
-                <a:spcPts val="993"/>
-              </a:spcAft>
-              <a:buClr>
-                <a:schemeClr val="accent1"/>
-              </a:buClr>
-              <a:buSzPct val="80000"/>
-              <a:buFont typeface="Corbel" pitchFamily="34" charset="0"/>
-              <a:buChar char="•"/>
-              <a:defRPr sz="4635" kern="1200">
-                <a:solidFill>
-                  <a:schemeClr val="accent1"/>
-                </a:solidFill>
-                <a:latin typeface="+mn-lt"/>
-                <a:ea typeface="+mn-ea"/>
-                <a:cs typeface="+mn-cs"/>
-              </a:defRPr>
-            </a:lvl8pPr>
-            <a:lvl9pPr marL="5628006" indent="-567603" algn="l" defTabSz="2270402" rtl="0" eaLnBrk="1" latinLnBrk="0" hangingPunct="1">
-              <a:lnSpc>
-                <a:spcPct val="90000"/>
-              </a:lnSpc>
-              <a:spcBef>
-                <a:spcPts val="499"/>
-              </a:spcBef>
-              <a:spcAft>
-                <a:spcPts val="993"/>
-              </a:spcAft>
-              <a:buClr>
-                <a:schemeClr val="accent1"/>
-              </a:buClr>
-              <a:buSzPct val="80000"/>
-              <a:buFont typeface="Corbel" pitchFamily="34" charset="0"/>
-              <a:buChar char="•"/>
-              <a:defRPr sz="4635" kern="1200">
-                <a:solidFill>
-                  <a:schemeClr val="accent1"/>
-                </a:solidFill>
-                <a:latin typeface="+mn-lt"/>
-                <a:ea typeface="+mn-ea"/>
-                <a:cs typeface="+mn-cs"/>
-              </a:defRPr>
-            </a:lvl9pPr>
-          </a:lstStyle>
-          <a:p>
-            <a:r>
-              <a:rPr lang="en-GB">
-                <a:solidFill>
-                  <a:schemeClr val="tx1"/>
-                </a:solidFill>
-                <a:latin typeface="Arial" panose="020B0604020202020204" pitchFamily="34" charset="0"/>
-                <a:cs typeface="Arial" panose="020B0604020202020204" pitchFamily="34" charset="0"/>
-              </a:rPr>
-              <a:t>Sample</a:t>
-            </a:r>
-          </a:p>
-        </p:txBody>
-      </p:sp>
+        <p:style>
+          <a:lnRef idx="1">
+            <a:schemeClr val="accent1"/>
+          </a:lnRef>
+          <a:fillRef idx="2">
+            <a:schemeClr val="accent1"/>
+          </a:fillRef>
+          <a:effectRef idx="1">
+            <a:schemeClr val="accent1"/>
+          </a:effectRef>
+          <a:fontRef idx="minor">
+            <a:schemeClr val="dk1"/>
+          </a:fontRef>
+        </p:style>
+      </p:cxnSp>
+      <p:cxnSp>
+        <p:nvCxnSpPr>
+          <p:cNvPr id="77" name="AutoShape 2">
+            <a:extLst>
+              <a:ext uri="{FF2B5EF4-FFF2-40B4-BE49-F238E27FC236}">
+                <a16:creationId xmlns:a16="http://schemas.microsoft.com/office/drawing/2014/main" id="{215DF66C-56BD-44FB-8801-16E69CB74001}"/>
+              </a:ext>
+            </a:extLst>
+          </p:cNvPr>
+          <p:cNvCxnSpPr>
+            <a:cxnSpLocks noChangeShapeType="1"/>
+          </p:cNvCxnSpPr>
+          <p:nvPr/>
+        </p:nvCxnSpPr>
+        <p:spPr bwMode="auto">
+          <a:xfrm flipH="1">
+            <a:off x="5333399" y="19952860"/>
+            <a:ext cx="6" cy="350991"/>
+          </a:xfrm>
+          <a:prstGeom prst="straightConnector1">
+            <a:avLst/>
+          </a:prstGeom>
+          <a:ln w="57150">
+            <a:headEnd/>
+            <a:tailEnd type="triangle" w="med" len="med"/>
+          </a:ln>
+          <a:extLst>
+            <a:ext uri="{AF507438-7753-43E0-B8FC-AC1667EBCBE1}">
+              <a14:hiddenEffects xmlns:a14="http://schemas.microsoft.com/office/drawing/2010/main">
+                <a:effectLst>
+                  <a:outerShdw dist="35921" dir="2700000" algn="ctr" rotWithShape="0">
+                    <a:srgbClr val="CCCCCC"/>
+                  </a:outerShdw>
+                </a:effectLst>
+              </a14:hiddenEffects>
+            </a:ext>
+          </a:extLst>
+        </p:spPr>
+        <p:style>
+          <a:lnRef idx="1">
+            <a:schemeClr val="accent1"/>
+          </a:lnRef>
+          <a:fillRef idx="2">
+            <a:schemeClr val="accent1"/>
+          </a:fillRef>
+          <a:effectRef idx="1">
+            <a:schemeClr val="accent1"/>
+          </a:effectRef>
+          <a:fontRef idx="minor">
+            <a:schemeClr val="dk1"/>
+          </a:fontRef>
+        </p:style>
+      </p:cxnSp>
+      <p:cxnSp>
+        <p:nvCxnSpPr>
+          <p:cNvPr id="85" name="AutoShape 2">
+            <a:extLst>
+              <a:ext uri="{FF2B5EF4-FFF2-40B4-BE49-F238E27FC236}">
+                <a16:creationId xmlns:a16="http://schemas.microsoft.com/office/drawing/2014/main" id="{AA9D782C-978B-4A64-A0C6-F0BE30798192}"/>
+              </a:ext>
+            </a:extLst>
+          </p:cNvPr>
+          <p:cNvCxnSpPr>
+            <a:cxnSpLocks noChangeShapeType="1"/>
+          </p:cNvCxnSpPr>
+          <p:nvPr/>
+        </p:nvCxnSpPr>
+        <p:spPr bwMode="auto">
+          <a:xfrm flipH="1">
+            <a:off x="5333700" y="21426176"/>
+            <a:ext cx="6" cy="350991"/>
+          </a:xfrm>
+          <a:prstGeom prst="straightConnector1">
+            <a:avLst/>
+          </a:prstGeom>
+          <a:ln w="57150">
+            <a:headEnd/>
+            <a:tailEnd type="triangle" w="med" len="med"/>
+          </a:ln>
+          <a:extLst>
+            <a:ext uri="{AF507438-7753-43E0-B8FC-AC1667EBCBE1}">
+              <a14:hiddenEffects xmlns:a14="http://schemas.microsoft.com/office/drawing/2010/main">
+                <a:effectLst>
+                  <a:outerShdw dist="35921" dir="2700000" algn="ctr" rotWithShape="0">
+                    <a:srgbClr val="CCCCCC"/>
+                  </a:outerShdw>
+                </a:effectLst>
+              </a14:hiddenEffects>
+            </a:ext>
+          </a:extLst>
+        </p:spPr>
+        <p:style>
+          <a:lnRef idx="1">
+            <a:schemeClr val="accent1"/>
+          </a:lnRef>
+          <a:fillRef idx="2">
+            <a:schemeClr val="accent1"/>
+          </a:fillRef>
+          <a:effectRef idx="1">
+            <a:schemeClr val="accent1"/>
+          </a:effectRef>
+          <a:fontRef idx="minor">
+            <a:schemeClr val="dk1"/>
+          </a:fontRef>
+        </p:style>
+      </p:cxnSp>
+      <p:cxnSp>
+        <p:nvCxnSpPr>
+          <p:cNvPr id="86" name="AutoShape 2">
+            <a:extLst>
+              <a:ext uri="{FF2B5EF4-FFF2-40B4-BE49-F238E27FC236}">
+                <a16:creationId xmlns:a16="http://schemas.microsoft.com/office/drawing/2014/main" id="{B369888E-9D8D-4782-A135-16B5202FB068}"/>
+              </a:ext>
+            </a:extLst>
+          </p:cNvPr>
+          <p:cNvCxnSpPr>
+            <a:cxnSpLocks noChangeShapeType="1"/>
+          </p:cNvCxnSpPr>
+          <p:nvPr/>
+        </p:nvCxnSpPr>
+        <p:spPr bwMode="auto">
+          <a:xfrm flipH="1">
+            <a:off x="5333393" y="22451890"/>
+            <a:ext cx="6" cy="350991"/>
+          </a:xfrm>
+          <a:prstGeom prst="straightConnector1">
+            <a:avLst/>
+          </a:prstGeom>
+          <a:ln w="57150">
+            <a:headEnd/>
+            <a:tailEnd type="triangle" w="med" len="med"/>
+          </a:ln>
+          <a:extLst>
+            <a:ext uri="{AF507438-7753-43E0-B8FC-AC1667EBCBE1}">
+              <a14:hiddenEffects xmlns:a14="http://schemas.microsoft.com/office/drawing/2010/main">
+                <a:effectLst>
+                  <a:outerShdw dist="35921" dir="2700000" algn="ctr" rotWithShape="0">
+                    <a:srgbClr val="CCCCCC"/>
+                  </a:outerShdw>
+                </a:effectLst>
+              </a14:hiddenEffects>
+            </a:ext>
+          </a:extLst>
+        </p:spPr>
+        <p:style>
+          <a:lnRef idx="1">
+            <a:schemeClr val="accent1"/>
+          </a:lnRef>
+          <a:fillRef idx="2">
+            <a:schemeClr val="accent1"/>
+          </a:fillRef>
+          <a:effectRef idx="1">
+            <a:schemeClr val="accent1"/>
+          </a:effectRef>
+          <a:fontRef idx="minor">
+            <a:schemeClr val="dk1"/>
+          </a:fontRef>
+        </p:style>
+      </p:cxnSp>
+      <p:cxnSp>
+        <p:nvCxnSpPr>
+          <p:cNvPr id="87" name="AutoShape 2">
+            <a:extLst>
+              <a:ext uri="{FF2B5EF4-FFF2-40B4-BE49-F238E27FC236}">
+                <a16:creationId xmlns:a16="http://schemas.microsoft.com/office/drawing/2014/main" id="{1A250632-DBFC-4E33-B1DB-29A56D5F9D2C}"/>
+              </a:ext>
+            </a:extLst>
+          </p:cNvPr>
+          <p:cNvCxnSpPr>
+            <a:cxnSpLocks noChangeShapeType="1"/>
+          </p:cNvCxnSpPr>
+          <p:nvPr/>
+        </p:nvCxnSpPr>
+        <p:spPr bwMode="auto">
+          <a:xfrm flipH="1">
+            <a:off x="5333700" y="23956553"/>
+            <a:ext cx="6" cy="350991"/>
+          </a:xfrm>
+          <a:prstGeom prst="straightConnector1">
+            <a:avLst/>
+          </a:prstGeom>
+          <a:ln w="57150">
+            <a:headEnd/>
+            <a:tailEnd type="triangle" w="med" len="med"/>
+          </a:ln>
+          <a:extLst>
+            <a:ext uri="{AF507438-7753-43E0-B8FC-AC1667EBCBE1}">
+              <a14:hiddenEffects xmlns:a14="http://schemas.microsoft.com/office/drawing/2010/main">
+                <a:effectLst>
+                  <a:outerShdw dist="35921" dir="2700000" algn="ctr" rotWithShape="0">
+                    <a:srgbClr val="CCCCCC"/>
+                  </a:outerShdw>
+                </a:effectLst>
+              </a14:hiddenEffects>
+            </a:ext>
+          </a:extLst>
+        </p:spPr>
+        <p:style>
+          <a:lnRef idx="1">
+            <a:schemeClr val="accent1"/>
+          </a:lnRef>
+          <a:fillRef idx="2">
+            <a:schemeClr val="accent1"/>
+          </a:fillRef>
+          <a:effectRef idx="1">
+            <a:schemeClr val="accent1"/>
+          </a:effectRef>
+          <a:fontRef idx="minor">
+            <a:schemeClr val="dk1"/>
+          </a:fontRef>
+        </p:style>
+      </p:cxnSp>
+      <p:cxnSp>
+        <p:nvCxnSpPr>
+          <p:cNvPr id="88" name="AutoShape 2">
+            <a:extLst>
+              <a:ext uri="{FF2B5EF4-FFF2-40B4-BE49-F238E27FC236}">
+                <a16:creationId xmlns:a16="http://schemas.microsoft.com/office/drawing/2014/main" id="{C7ADA4E1-337D-4C78-B1C9-99A001F5AE49}"/>
+              </a:ext>
+            </a:extLst>
+          </p:cNvPr>
+          <p:cNvCxnSpPr>
+            <a:cxnSpLocks noChangeShapeType="1"/>
+          </p:cNvCxnSpPr>
+          <p:nvPr/>
+        </p:nvCxnSpPr>
+        <p:spPr bwMode="auto">
+          <a:xfrm>
+            <a:off x="8349635" y="19371249"/>
+            <a:ext cx="578591" cy="0"/>
+          </a:xfrm>
+          <a:prstGeom prst="straightConnector1">
+            <a:avLst/>
+          </a:prstGeom>
+          <a:ln w="57150">
+            <a:headEnd/>
+            <a:tailEnd type="triangle" w="med" len="med"/>
+          </a:ln>
+          <a:extLst>
+            <a:ext uri="{AF507438-7753-43E0-B8FC-AC1667EBCBE1}">
+              <a14:hiddenEffects xmlns:a14="http://schemas.microsoft.com/office/drawing/2010/main">
+                <a:effectLst>
+                  <a:outerShdw dist="35921" dir="2700000" algn="ctr" rotWithShape="0">
+                    <a:srgbClr val="CCCCCC"/>
+                  </a:outerShdw>
+                </a:effectLst>
+              </a14:hiddenEffects>
+            </a:ext>
+          </a:extLst>
+        </p:spPr>
+        <p:style>
+          <a:lnRef idx="1">
+            <a:schemeClr val="accent1"/>
+          </a:lnRef>
+          <a:fillRef idx="2">
+            <a:schemeClr val="accent1"/>
+          </a:fillRef>
+          <a:effectRef idx="1">
+            <a:schemeClr val="accent1"/>
+          </a:effectRef>
+          <a:fontRef idx="minor">
+            <a:schemeClr val="dk1"/>
+          </a:fontRef>
+        </p:style>
+      </p:cxnSp>
+      <p:cxnSp>
+        <p:nvCxnSpPr>
+          <p:cNvPr id="89" name="AutoShape 2">
+            <a:extLst>
+              <a:ext uri="{FF2B5EF4-FFF2-40B4-BE49-F238E27FC236}">
+                <a16:creationId xmlns:a16="http://schemas.microsoft.com/office/drawing/2014/main" id="{0780CCB9-9FDF-475E-B4E2-15D898F19146}"/>
+              </a:ext>
+            </a:extLst>
+          </p:cNvPr>
+          <p:cNvCxnSpPr>
+            <a:cxnSpLocks noChangeShapeType="1"/>
+          </p:cNvCxnSpPr>
+          <p:nvPr/>
+        </p:nvCxnSpPr>
+        <p:spPr bwMode="auto">
+          <a:xfrm>
+            <a:off x="8349635" y="20885092"/>
+            <a:ext cx="578591" cy="0"/>
+          </a:xfrm>
+          <a:prstGeom prst="straightConnector1">
+            <a:avLst/>
+          </a:prstGeom>
+          <a:ln w="57150">
+            <a:headEnd/>
+            <a:tailEnd type="triangle" w="med" len="med"/>
+          </a:ln>
+          <a:extLst>
+            <a:ext uri="{AF507438-7753-43E0-B8FC-AC1667EBCBE1}">
+              <a14:hiddenEffects xmlns:a14="http://schemas.microsoft.com/office/drawing/2010/main">
+                <a:effectLst>
+                  <a:outerShdw dist="35921" dir="2700000" algn="ctr" rotWithShape="0">
+                    <a:srgbClr val="CCCCCC"/>
+                  </a:outerShdw>
+                </a:effectLst>
+              </a14:hiddenEffects>
+            </a:ext>
+          </a:extLst>
+        </p:spPr>
+        <p:style>
+          <a:lnRef idx="1">
+            <a:schemeClr val="accent1"/>
+          </a:lnRef>
+          <a:fillRef idx="2">
+            <a:schemeClr val="accent1"/>
+          </a:fillRef>
+          <a:effectRef idx="1">
+            <a:schemeClr val="accent1"/>
+          </a:effectRef>
+          <a:fontRef idx="minor">
+            <a:schemeClr val="dk1"/>
+          </a:fontRef>
+        </p:style>
+      </p:cxnSp>
+      <p:cxnSp>
+        <p:nvCxnSpPr>
+          <p:cNvPr id="98" name="AutoShape 2">
+            <a:extLst>
+              <a:ext uri="{FF2B5EF4-FFF2-40B4-BE49-F238E27FC236}">
+                <a16:creationId xmlns:a16="http://schemas.microsoft.com/office/drawing/2014/main" id="{6DE365BE-B160-4B61-8339-EEDED00EE5FB}"/>
+              </a:ext>
+            </a:extLst>
+          </p:cNvPr>
+          <p:cNvCxnSpPr>
+            <a:cxnSpLocks noChangeShapeType="1"/>
+          </p:cNvCxnSpPr>
+          <p:nvPr/>
+        </p:nvCxnSpPr>
+        <p:spPr bwMode="auto">
+          <a:xfrm>
+            <a:off x="8349634" y="24596391"/>
+            <a:ext cx="532077" cy="0"/>
+          </a:xfrm>
+          <a:prstGeom prst="straightConnector1">
+            <a:avLst/>
+          </a:prstGeom>
+          <a:ln w="57150">
+            <a:headEnd/>
+            <a:tailEnd type="triangle" w="med" len="med"/>
+          </a:ln>
+          <a:extLst>
+            <a:ext uri="{AF507438-7753-43E0-B8FC-AC1667EBCBE1}">
+              <a14:hiddenEffects xmlns:a14="http://schemas.microsoft.com/office/drawing/2010/main">
+                <a:effectLst>
+                  <a:outerShdw dist="35921" dir="2700000" algn="ctr" rotWithShape="0">
+                    <a:srgbClr val="CCCCCC"/>
+                  </a:outerShdw>
+                </a:effectLst>
+              </a14:hiddenEffects>
+            </a:ext>
+          </a:extLst>
+        </p:spPr>
+        <p:style>
+          <a:lnRef idx="1">
+            <a:schemeClr val="accent1"/>
+          </a:lnRef>
+          <a:fillRef idx="2">
+            <a:schemeClr val="accent1"/>
+          </a:fillRef>
+          <a:effectRef idx="1">
+            <a:schemeClr val="accent1"/>
+          </a:effectRef>
+          <a:fontRef idx="minor">
+            <a:schemeClr val="dk1"/>
+          </a:fontRef>
+        </p:style>
+      </p:cxnSp>
     </p:spTree>
     <p:extLst>
       <p:ext uri="{BB962C8B-B14F-4D97-AF65-F5344CB8AC3E}">

</xml_diff>